<commit_message>
Add slides and pdf
</commit_message>
<xml_diff>
--- a/Presentation.pptx
+++ b/Presentation.pptx
@@ -11,9 +11,18 @@
     <p:sldId id="270" r:id="rId5"/>
     <p:sldId id="271" r:id="rId6"/>
     <p:sldId id="273" r:id="rId7"/>
-    <p:sldId id="274" r:id="rId8"/>
-    <p:sldId id="268" r:id="rId9"/>
-    <p:sldId id="260" r:id="rId10"/>
+    <p:sldId id="275" r:id="rId8"/>
+    <p:sldId id="276" r:id="rId9"/>
+    <p:sldId id="277" r:id="rId10"/>
+    <p:sldId id="274" r:id="rId11"/>
+    <p:sldId id="278" r:id="rId12"/>
+    <p:sldId id="279" r:id="rId13"/>
+    <p:sldId id="281" r:id="rId14"/>
+    <p:sldId id="282" r:id="rId15"/>
+    <p:sldId id="283" r:id="rId16"/>
+    <p:sldId id="284" r:id="rId17"/>
+    <p:sldId id="268" r:id="rId18"/>
+    <p:sldId id="260" r:id="rId19"/>
   </p:sldIdLst>
   <p:sldSz cx="12192000" cy="6858000"/>
   <p:notesSz cx="6858000" cy="9144000"/>
@@ -113,6 +122,44 @@
     </a:lvl9pPr>
   </p:defaultTextStyle>
   <p:extLst>
+    <p:ext uri="{521415D9-36F7-43E2-AB2F-B90AF26B5E84}">
+      <p14:sectionLst xmlns:p14="http://schemas.microsoft.com/office/powerpoint/2010/main">
+        <p14:section name="Introdução" id="{EFC5D028-02AA-4CF2-A20D-A98DF0C1FFDC}">
+          <p14:sldIdLst>
+            <p14:sldId id="256"/>
+            <p14:sldId id="257"/>
+            <p14:sldId id="269"/>
+            <p14:sldId id="270"/>
+            <p14:sldId id="271"/>
+          </p14:sldIdLst>
+        </p14:section>
+        <p14:section name="Grafo" id="{E186ECCB-28CF-4986-825F-645DE771ABF9}">
+          <p14:sldIdLst>
+            <p14:sldId id="273"/>
+            <p14:sldId id="275"/>
+            <p14:sldId id="276"/>
+            <p14:sldId id="277"/>
+            <p14:sldId id="274"/>
+          </p14:sldIdLst>
+        </p14:section>
+        <p14:section name="Pseudo-Código" id="{FED14AC1-3DA6-4E07-AAA3-2D36F5D4347B}">
+          <p14:sldIdLst>
+            <p14:sldId id="278"/>
+            <p14:sldId id="279"/>
+            <p14:sldId id="281"/>
+            <p14:sldId id="282"/>
+            <p14:sldId id="283"/>
+            <p14:sldId id="284"/>
+          </p14:sldIdLst>
+        </p14:section>
+        <p14:section name="Conclusão" id="{C7166199-B626-48D1-B67B-6C1B08882AC4}">
+          <p14:sldIdLst>
+            <p14:sldId id="268"/>
+            <p14:sldId id="260"/>
+          </p14:sldIdLst>
+        </p14:section>
+      </p14:sectionLst>
+    </p:ext>
     <p:ext uri="{EFAFB233-063F-42B5-8137-9DF3F51BA10A}">
       <p15:sldGuideLst xmlns:p15="http://schemas.microsoft.com/office/powerpoint/2012/main"/>
     </p:ext>
@@ -1642,8 +1689,8 @@
   </pc:docChgLst>
   <pc:docChgLst>
     <pc:chgData name="Eduardo Savian" userId="83fefb37af455394" providerId="LiveId" clId="{C0BAD29C-331F-4880-BE27-02788087E9E9}"/>
-    <pc:docChg chg="undo custSel addSld delSld modSld">
-      <pc:chgData name="Eduardo Savian" userId="83fefb37af455394" providerId="LiveId" clId="{C0BAD29C-331F-4880-BE27-02788087E9E9}" dt="2024-06-18T20:13:06.448" v="357" actId="2696"/>
+    <pc:docChg chg="undo custSel addSld delSld modSld addSection modSection">
+      <pc:chgData name="Eduardo Savian" userId="83fefb37af455394" providerId="LiveId" clId="{C0BAD29C-331F-4880-BE27-02788087E9E9}" dt="2024-06-19T02:23:38.154" v="475"/>
       <pc:docMkLst>
         <pc:docMk/>
       </pc:docMkLst>
@@ -1888,18 +1935,423 @@
           </ac:graphicFrameMkLst>
         </pc:graphicFrameChg>
       </pc:sldChg>
-      <pc:sldChg chg="new">
-        <pc:chgData name="Eduardo Savian" userId="83fefb37af455394" providerId="LiveId" clId="{C0BAD29C-331F-4880-BE27-02788087E9E9}" dt="2024-06-18T19:38:46.727" v="325" actId="680"/>
+      <pc:sldChg chg="addSp delSp modSp new mod">
+        <pc:chgData name="Eduardo Savian" userId="83fefb37af455394" providerId="LiveId" clId="{C0BAD29C-331F-4880-BE27-02788087E9E9}" dt="2024-06-19T02:23:28.761" v="471" actId="20577"/>
         <pc:sldMkLst>
           <pc:docMk/>
           <pc:sldMk cId="627731158" sldId="273"/>
         </pc:sldMkLst>
-      </pc:sldChg>
-      <pc:sldChg chg="new">
-        <pc:chgData name="Eduardo Savian" userId="83fefb37af455394" providerId="LiveId" clId="{C0BAD29C-331F-4880-BE27-02788087E9E9}" dt="2024-06-18T19:38:46.912" v="326" actId="680"/>
+        <pc:spChg chg="mod">
+          <ac:chgData name="Eduardo Savian" userId="83fefb37af455394" providerId="LiveId" clId="{C0BAD29C-331F-4880-BE27-02788087E9E9}" dt="2024-06-19T02:23:28.761" v="471" actId="20577"/>
+          <ac:spMkLst>
+            <pc:docMk/>
+            <pc:sldMk cId="627731158" sldId="273"/>
+            <ac:spMk id="2" creationId="{D45B3DA6-2583-8662-3F54-10387839249A}"/>
+          </ac:spMkLst>
+        </pc:spChg>
+        <pc:spChg chg="del">
+          <ac:chgData name="Eduardo Savian" userId="83fefb37af455394" providerId="LiveId" clId="{C0BAD29C-331F-4880-BE27-02788087E9E9}" dt="2024-06-19T01:53:55.888" v="358" actId="22"/>
+          <ac:spMkLst>
+            <pc:docMk/>
+            <pc:sldMk cId="627731158" sldId="273"/>
+            <ac:spMk id="3" creationId="{952ACA38-F60B-B84E-65EC-5BEC1FDD2299}"/>
+          </ac:spMkLst>
+        </pc:spChg>
+        <pc:spChg chg="add del mod">
+          <ac:chgData name="Eduardo Savian" userId="83fefb37af455394" providerId="LiveId" clId="{C0BAD29C-331F-4880-BE27-02788087E9E9}" dt="2024-06-19T02:04:22.457" v="390" actId="22"/>
+          <ac:spMkLst>
+            <pc:docMk/>
+            <pc:sldMk cId="627731158" sldId="273"/>
+            <ac:spMk id="10" creationId="{B8B9A841-3872-7D4A-2E3C-F6270E619421}"/>
+          </ac:spMkLst>
+        </pc:spChg>
+        <pc:picChg chg="add del mod ord">
+          <ac:chgData name="Eduardo Savian" userId="83fefb37af455394" providerId="LiveId" clId="{C0BAD29C-331F-4880-BE27-02788087E9E9}" dt="2024-06-19T02:04:19.789" v="389" actId="478"/>
+          <ac:picMkLst>
+            <pc:docMk/>
+            <pc:sldMk cId="627731158" sldId="273"/>
+            <ac:picMk id="8" creationId="{8CD9ECCB-D4C9-73CE-A7B3-1D6F17A7EEFD}"/>
+          </ac:picMkLst>
+        </pc:picChg>
+        <pc:picChg chg="add mod ord">
+          <ac:chgData name="Eduardo Savian" userId="83fefb37af455394" providerId="LiveId" clId="{C0BAD29C-331F-4880-BE27-02788087E9E9}" dt="2024-06-19T02:04:22.457" v="390" actId="22"/>
+          <ac:picMkLst>
+            <pc:docMk/>
+            <pc:sldMk cId="627731158" sldId="273"/>
+            <ac:picMk id="12" creationId="{B554D133-E162-8312-CF47-01FA75301D3D}"/>
+          </ac:picMkLst>
+        </pc:picChg>
+      </pc:sldChg>
+      <pc:sldChg chg="addSp delSp modSp new mod">
+        <pc:chgData name="Eduardo Savian" userId="83fefb37af455394" providerId="LiveId" clId="{C0BAD29C-331F-4880-BE27-02788087E9E9}" dt="2024-06-19T02:23:38.154" v="475"/>
         <pc:sldMkLst>
           <pc:docMk/>
           <pc:sldMk cId="3523369083" sldId="274"/>
+        </pc:sldMkLst>
+        <pc:spChg chg="mod">
+          <ac:chgData name="Eduardo Savian" userId="83fefb37af455394" providerId="LiveId" clId="{C0BAD29C-331F-4880-BE27-02788087E9E9}" dt="2024-06-19T02:23:38.154" v="475"/>
+          <ac:spMkLst>
+            <pc:docMk/>
+            <pc:sldMk cId="3523369083" sldId="274"/>
+            <ac:spMk id="2" creationId="{72540168-690A-37A3-E7DF-CE9E07425A35}"/>
+          </ac:spMkLst>
+        </pc:spChg>
+        <pc:spChg chg="del">
+          <ac:chgData name="Eduardo Savian" userId="83fefb37af455394" providerId="LiveId" clId="{C0BAD29C-331F-4880-BE27-02788087E9E9}" dt="2024-06-19T02:05:44.207" v="395" actId="22"/>
+          <ac:spMkLst>
+            <pc:docMk/>
+            <pc:sldMk cId="3523369083" sldId="274"/>
+            <ac:spMk id="3" creationId="{6C080BB9-26FF-5CC0-708F-C8E7C71EAD35}"/>
+          </ac:spMkLst>
+        </pc:spChg>
+        <pc:spChg chg="add del mod">
+          <ac:chgData name="Eduardo Savian" userId="83fefb37af455394" providerId="LiveId" clId="{C0BAD29C-331F-4880-BE27-02788087E9E9}" dt="2024-06-19T02:13:51" v="403" actId="22"/>
+          <ac:spMkLst>
+            <pc:docMk/>
+            <pc:sldMk cId="3523369083" sldId="274"/>
+            <ac:spMk id="10" creationId="{FA2A1CCA-F521-ED97-5DE4-8D39A73528EA}"/>
+          </ac:spMkLst>
+        </pc:spChg>
+        <pc:spChg chg="add del">
+          <ac:chgData name="Eduardo Savian" userId="83fefb37af455394" providerId="LiveId" clId="{C0BAD29C-331F-4880-BE27-02788087E9E9}" dt="2024-06-19T02:15:57.509" v="410" actId="22"/>
+          <ac:spMkLst>
+            <pc:docMk/>
+            <pc:sldMk cId="3523369083" sldId="274"/>
+            <ac:spMk id="14" creationId="{18F04D48-6E7F-7BB0-B029-DAEF631D4C2B}"/>
+          </ac:spMkLst>
+        </pc:spChg>
+        <pc:picChg chg="add del mod ord">
+          <ac:chgData name="Eduardo Savian" userId="83fefb37af455394" providerId="LiveId" clId="{C0BAD29C-331F-4880-BE27-02788087E9E9}" dt="2024-06-19T02:13:28.647" v="402" actId="478"/>
+          <ac:picMkLst>
+            <pc:docMk/>
+            <pc:sldMk cId="3523369083" sldId="274"/>
+            <ac:picMk id="8" creationId="{18B1403C-8148-6A5E-AEC8-758A82BC46E0}"/>
+          </ac:picMkLst>
+        </pc:picChg>
+        <pc:picChg chg="add mod ord">
+          <ac:chgData name="Eduardo Savian" userId="83fefb37af455394" providerId="LiveId" clId="{C0BAD29C-331F-4880-BE27-02788087E9E9}" dt="2024-06-19T02:13:51" v="403" actId="22"/>
+          <ac:picMkLst>
+            <pc:docMk/>
+            <pc:sldMk cId="3523369083" sldId="274"/>
+            <ac:picMk id="12" creationId="{5A4C757B-6803-E038-4398-6F3D97F5288C}"/>
+          </ac:picMkLst>
+        </pc:picChg>
+      </pc:sldChg>
+      <pc:sldChg chg="addSp delSp modSp new mod">
+        <pc:chgData name="Eduardo Savian" userId="83fefb37af455394" providerId="LiveId" clId="{C0BAD29C-331F-4880-BE27-02788087E9E9}" dt="2024-06-19T02:23:32.131" v="472"/>
+        <pc:sldMkLst>
+          <pc:docMk/>
+          <pc:sldMk cId="1217120992" sldId="275"/>
+        </pc:sldMkLst>
+        <pc:spChg chg="mod">
+          <ac:chgData name="Eduardo Savian" userId="83fefb37af455394" providerId="LiveId" clId="{C0BAD29C-331F-4880-BE27-02788087E9E9}" dt="2024-06-19T02:23:32.131" v="472"/>
+          <ac:spMkLst>
+            <pc:docMk/>
+            <pc:sldMk cId="1217120992" sldId="275"/>
+            <ac:spMk id="2" creationId="{D6EF0203-0FD0-7631-55B9-F7DBF87560D8}"/>
+          </ac:spMkLst>
+        </pc:spChg>
+        <pc:spChg chg="del">
+          <ac:chgData name="Eduardo Savian" userId="83fefb37af455394" providerId="LiveId" clId="{C0BAD29C-331F-4880-BE27-02788087E9E9}" dt="2024-06-19T02:04:58.285" v="393" actId="22"/>
+          <ac:spMkLst>
+            <pc:docMk/>
+            <pc:sldMk cId="1217120992" sldId="275"/>
+            <ac:spMk id="3" creationId="{ECEF24F9-410A-E11E-A644-1C7025266713}"/>
+          </ac:spMkLst>
+        </pc:spChg>
+        <pc:picChg chg="add mod ord">
+          <ac:chgData name="Eduardo Savian" userId="83fefb37af455394" providerId="LiveId" clId="{C0BAD29C-331F-4880-BE27-02788087E9E9}" dt="2024-06-19T02:04:58.285" v="393" actId="22"/>
+          <ac:picMkLst>
+            <pc:docMk/>
+            <pc:sldMk cId="1217120992" sldId="275"/>
+            <ac:picMk id="8" creationId="{DABDF2D5-EB21-74D7-5DB5-EAC903EE467C}"/>
+          </ac:picMkLst>
+        </pc:picChg>
+      </pc:sldChg>
+      <pc:sldChg chg="addSp delSp modSp new mod">
+        <pc:chgData name="Eduardo Savian" userId="83fefb37af455394" providerId="LiveId" clId="{C0BAD29C-331F-4880-BE27-02788087E9E9}" dt="2024-06-19T02:23:33.501" v="473"/>
+        <pc:sldMkLst>
+          <pc:docMk/>
+          <pc:sldMk cId="813822317" sldId="276"/>
+        </pc:sldMkLst>
+        <pc:spChg chg="mod">
+          <ac:chgData name="Eduardo Savian" userId="83fefb37af455394" providerId="LiveId" clId="{C0BAD29C-331F-4880-BE27-02788087E9E9}" dt="2024-06-19T02:23:33.501" v="473"/>
+          <ac:spMkLst>
+            <pc:docMk/>
+            <pc:sldMk cId="813822317" sldId="276"/>
+            <ac:spMk id="2" creationId="{9FD510CF-AB6C-8BCB-FFB1-434DCA12FCFC}"/>
+          </ac:spMkLst>
+        </pc:spChg>
+        <pc:spChg chg="del">
+          <ac:chgData name="Eduardo Savian" userId="83fefb37af455394" providerId="LiveId" clId="{C0BAD29C-331F-4880-BE27-02788087E9E9}" dt="2024-06-19T02:05:25.423" v="394" actId="22"/>
+          <ac:spMkLst>
+            <pc:docMk/>
+            <pc:sldMk cId="813822317" sldId="276"/>
+            <ac:spMk id="3" creationId="{7BE21E6B-07A7-A15F-E46C-B9E0FDB71D5F}"/>
+          </ac:spMkLst>
+        </pc:spChg>
+        <pc:picChg chg="add mod ord">
+          <ac:chgData name="Eduardo Savian" userId="83fefb37af455394" providerId="LiveId" clId="{C0BAD29C-331F-4880-BE27-02788087E9E9}" dt="2024-06-19T02:05:25.423" v="394" actId="22"/>
+          <ac:picMkLst>
+            <pc:docMk/>
+            <pc:sldMk cId="813822317" sldId="276"/>
+            <ac:picMk id="8" creationId="{7AA32744-C6BF-74B2-EC95-E84101C81EC9}"/>
+          </ac:picMkLst>
+        </pc:picChg>
+      </pc:sldChg>
+      <pc:sldChg chg="addSp delSp modSp new mod">
+        <pc:chgData name="Eduardo Savian" userId="83fefb37af455394" providerId="LiveId" clId="{C0BAD29C-331F-4880-BE27-02788087E9E9}" dt="2024-06-19T02:23:35.422" v="474"/>
+        <pc:sldMkLst>
+          <pc:docMk/>
+          <pc:sldMk cId="4261432874" sldId="277"/>
+        </pc:sldMkLst>
+        <pc:spChg chg="mod">
+          <ac:chgData name="Eduardo Savian" userId="83fefb37af455394" providerId="LiveId" clId="{C0BAD29C-331F-4880-BE27-02788087E9E9}" dt="2024-06-19T02:23:35.422" v="474"/>
+          <ac:spMkLst>
+            <pc:docMk/>
+            <pc:sldMk cId="4261432874" sldId="277"/>
+            <ac:spMk id="2" creationId="{A7EC0090-83D8-DB09-3E8D-B27611167555}"/>
+          </ac:spMkLst>
+        </pc:spChg>
+        <pc:spChg chg="del">
+          <ac:chgData name="Eduardo Savian" userId="83fefb37af455394" providerId="LiveId" clId="{C0BAD29C-331F-4880-BE27-02788087E9E9}" dt="2024-06-19T02:13:26.186" v="401" actId="22"/>
+          <ac:spMkLst>
+            <pc:docMk/>
+            <pc:sldMk cId="4261432874" sldId="277"/>
+            <ac:spMk id="3" creationId="{3D9B6C9D-7FB2-FD6E-2CA9-9D1E7B41B455}"/>
+          </ac:spMkLst>
+        </pc:spChg>
+        <pc:picChg chg="add mod ord">
+          <ac:chgData name="Eduardo Savian" userId="83fefb37af455394" providerId="LiveId" clId="{C0BAD29C-331F-4880-BE27-02788087E9E9}" dt="2024-06-19T02:13:26.186" v="401" actId="22"/>
+          <ac:picMkLst>
+            <pc:docMk/>
+            <pc:sldMk cId="4261432874" sldId="277"/>
+            <ac:picMk id="8" creationId="{511A7518-9CCE-551A-1B5E-7B91241C4971}"/>
+          </ac:picMkLst>
+        </pc:picChg>
+      </pc:sldChg>
+      <pc:sldChg chg="addSp delSp modSp new mod">
+        <pc:chgData name="Eduardo Savian" userId="83fefb37af455394" providerId="LiveId" clId="{C0BAD29C-331F-4880-BE27-02788087E9E9}" dt="2024-06-19T02:16:58.063" v="437" actId="22"/>
+        <pc:sldMkLst>
+          <pc:docMk/>
+          <pc:sldMk cId="642999662" sldId="278"/>
+        </pc:sldMkLst>
+        <pc:spChg chg="mod">
+          <ac:chgData name="Eduardo Savian" userId="83fefb37af455394" providerId="LiveId" clId="{C0BAD29C-331F-4880-BE27-02788087E9E9}" dt="2024-06-19T02:16:06.217" v="432" actId="20577"/>
+          <ac:spMkLst>
+            <pc:docMk/>
+            <pc:sldMk cId="642999662" sldId="278"/>
+            <ac:spMk id="2" creationId="{46EEE6C0-874C-DBBC-0A05-CFC3B25748E2}"/>
+          </ac:spMkLst>
+        </pc:spChg>
+        <pc:spChg chg="del">
+          <ac:chgData name="Eduardo Savian" userId="83fefb37af455394" providerId="LiveId" clId="{C0BAD29C-331F-4880-BE27-02788087E9E9}" dt="2024-06-19T02:16:58.063" v="437" actId="22"/>
+          <ac:spMkLst>
+            <pc:docMk/>
+            <pc:sldMk cId="642999662" sldId="278"/>
+            <ac:spMk id="3" creationId="{B18140EC-8C70-2B25-97D5-B03868C255CD}"/>
+          </ac:spMkLst>
+        </pc:spChg>
+        <pc:picChg chg="add mod ord">
+          <ac:chgData name="Eduardo Savian" userId="83fefb37af455394" providerId="LiveId" clId="{C0BAD29C-331F-4880-BE27-02788087E9E9}" dt="2024-06-19T02:16:58.063" v="437" actId="22"/>
+          <ac:picMkLst>
+            <pc:docMk/>
+            <pc:sldMk cId="642999662" sldId="278"/>
+            <ac:picMk id="8" creationId="{B84365D3-41D7-B117-0C3A-76323D9CE944}"/>
+          </ac:picMkLst>
+        </pc:picChg>
+      </pc:sldChg>
+      <pc:sldChg chg="addSp delSp modSp new mod">
+        <pc:chgData name="Eduardo Savian" userId="83fefb37af455394" providerId="LiveId" clId="{C0BAD29C-331F-4880-BE27-02788087E9E9}" dt="2024-06-19T02:17:22.601" v="438" actId="22"/>
+        <pc:sldMkLst>
+          <pc:docMk/>
+          <pc:sldMk cId="2061843158" sldId="279"/>
+        </pc:sldMkLst>
+        <pc:spChg chg="mod">
+          <ac:chgData name="Eduardo Savian" userId="83fefb37af455394" providerId="LiveId" clId="{C0BAD29C-331F-4880-BE27-02788087E9E9}" dt="2024-06-19T02:16:12.490" v="435"/>
+          <ac:spMkLst>
+            <pc:docMk/>
+            <pc:sldMk cId="2061843158" sldId="279"/>
+            <ac:spMk id="2" creationId="{5B2A0EA0-A363-FEA4-4CD4-4A76C4624E68}"/>
+          </ac:spMkLst>
+        </pc:spChg>
+        <pc:spChg chg="del">
+          <ac:chgData name="Eduardo Savian" userId="83fefb37af455394" providerId="LiveId" clId="{C0BAD29C-331F-4880-BE27-02788087E9E9}" dt="2024-06-19T02:17:22.601" v="438" actId="22"/>
+          <ac:spMkLst>
+            <pc:docMk/>
+            <pc:sldMk cId="2061843158" sldId="279"/>
+            <ac:spMk id="3" creationId="{68867F34-4D57-6443-8B4F-961DB7E69476}"/>
+          </ac:spMkLst>
+        </pc:spChg>
+        <pc:picChg chg="add mod ord">
+          <ac:chgData name="Eduardo Savian" userId="83fefb37af455394" providerId="LiveId" clId="{C0BAD29C-331F-4880-BE27-02788087E9E9}" dt="2024-06-19T02:17:22.601" v="438" actId="22"/>
+          <ac:picMkLst>
+            <pc:docMk/>
+            <pc:sldMk cId="2061843158" sldId="279"/>
+            <ac:picMk id="8" creationId="{7CD76E04-D522-973B-6EE1-A40171303F89}"/>
+          </ac:picMkLst>
+        </pc:picChg>
+      </pc:sldChg>
+      <pc:sldChg chg="addSp delSp modSp new del mod">
+        <pc:chgData name="Eduardo Savian" userId="83fefb37af455394" providerId="LiveId" clId="{C0BAD29C-331F-4880-BE27-02788087E9E9}" dt="2024-06-19T02:20:12.152" v="456" actId="47"/>
+        <pc:sldMkLst>
+          <pc:docMk/>
+          <pc:sldMk cId="2536522868" sldId="280"/>
+        </pc:sldMkLst>
+        <pc:spChg chg="mod">
+          <ac:chgData name="Eduardo Savian" userId="83fefb37af455394" providerId="LiveId" clId="{C0BAD29C-331F-4880-BE27-02788087E9E9}" dt="2024-06-19T02:16:13.539" v="436"/>
+          <ac:spMkLst>
+            <pc:docMk/>
+            <pc:sldMk cId="2536522868" sldId="280"/>
+            <ac:spMk id="2" creationId="{6CD8D164-605F-97AF-0EF9-C03D87FDB8FC}"/>
+          </ac:spMkLst>
+        </pc:spChg>
+        <pc:spChg chg="add del">
+          <ac:chgData name="Eduardo Savian" userId="83fefb37af455394" providerId="LiveId" clId="{C0BAD29C-331F-4880-BE27-02788087E9E9}" dt="2024-06-19T02:18:05.217" v="440" actId="22"/>
+          <ac:spMkLst>
+            <pc:docMk/>
+            <pc:sldMk cId="2536522868" sldId="280"/>
+            <ac:spMk id="3" creationId="{1E0503DA-7991-6A13-8E4B-14AF8A57C834}"/>
+          </ac:spMkLst>
+        </pc:spChg>
+        <pc:picChg chg="add del mod ord">
+          <ac:chgData name="Eduardo Savian" userId="83fefb37af455394" providerId="LiveId" clId="{C0BAD29C-331F-4880-BE27-02788087E9E9}" dt="2024-06-19T02:18:05.217" v="440" actId="22"/>
+          <ac:picMkLst>
+            <pc:docMk/>
+            <pc:sldMk cId="2536522868" sldId="280"/>
+            <ac:picMk id="8" creationId="{0632DD90-4EDA-19E5-FA53-C4251E1CF8BA}"/>
+          </ac:picMkLst>
+        </pc:picChg>
+      </pc:sldChg>
+      <pc:sldChg chg="addSp delSp modSp new mod">
+        <pc:chgData name="Eduardo Savian" userId="83fefb37af455394" providerId="LiveId" clId="{C0BAD29C-331F-4880-BE27-02788087E9E9}" dt="2024-06-19T02:20:03.116" v="452"/>
+        <pc:sldMkLst>
+          <pc:docMk/>
+          <pc:sldMk cId="3452563875" sldId="281"/>
+        </pc:sldMkLst>
+        <pc:spChg chg="mod">
+          <ac:chgData name="Eduardo Savian" userId="83fefb37af455394" providerId="LiveId" clId="{C0BAD29C-331F-4880-BE27-02788087E9E9}" dt="2024-06-19T02:20:03.116" v="452"/>
+          <ac:spMkLst>
+            <pc:docMk/>
+            <pc:sldMk cId="3452563875" sldId="281"/>
+            <ac:spMk id="2" creationId="{B181ADD0-7F40-AA4C-FCFF-A8DFD2B35DA6}"/>
+          </ac:spMkLst>
+        </pc:spChg>
+        <pc:spChg chg="del">
+          <ac:chgData name="Eduardo Savian" userId="83fefb37af455394" providerId="LiveId" clId="{C0BAD29C-331F-4880-BE27-02788087E9E9}" dt="2024-06-19T02:18:41.236" v="442" actId="22"/>
+          <ac:spMkLst>
+            <pc:docMk/>
+            <pc:sldMk cId="3452563875" sldId="281"/>
+            <ac:spMk id="3" creationId="{17A98DEB-1809-2E18-4117-2CE94AB652F8}"/>
+          </ac:spMkLst>
+        </pc:spChg>
+        <pc:picChg chg="add mod ord">
+          <ac:chgData name="Eduardo Savian" userId="83fefb37af455394" providerId="LiveId" clId="{C0BAD29C-331F-4880-BE27-02788087E9E9}" dt="2024-06-19T02:18:41.236" v="442" actId="22"/>
+          <ac:picMkLst>
+            <pc:docMk/>
+            <pc:sldMk cId="3452563875" sldId="281"/>
+            <ac:picMk id="8" creationId="{7608FD13-E51A-6B6E-957F-4F3A152E63BE}"/>
+          </ac:picMkLst>
+        </pc:picChg>
+      </pc:sldChg>
+      <pc:sldChg chg="addSp delSp modSp new mod">
+        <pc:chgData name="Eduardo Savian" userId="83fefb37af455394" providerId="LiveId" clId="{C0BAD29C-331F-4880-BE27-02788087E9E9}" dt="2024-06-19T02:20:04.205" v="453"/>
+        <pc:sldMkLst>
+          <pc:docMk/>
+          <pc:sldMk cId="2707155307" sldId="282"/>
+        </pc:sldMkLst>
+        <pc:spChg chg="mod">
+          <ac:chgData name="Eduardo Savian" userId="83fefb37af455394" providerId="LiveId" clId="{C0BAD29C-331F-4880-BE27-02788087E9E9}" dt="2024-06-19T02:20:04.205" v="453"/>
+          <ac:spMkLst>
+            <pc:docMk/>
+            <pc:sldMk cId="2707155307" sldId="282"/>
+            <ac:spMk id="2" creationId="{2C7603AB-3635-A747-D72A-F657752D300B}"/>
+          </ac:spMkLst>
+        </pc:spChg>
+        <pc:spChg chg="del">
+          <ac:chgData name="Eduardo Savian" userId="83fefb37af455394" providerId="LiveId" clId="{C0BAD29C-331F-4880-BE27-02788087E9E9}" dt="2024-06-19T02:19:05.270" v="444" actId="22"/>
+          <ac:spMkLst>
+            <pc:docMk/>
+            <pc:sldMk cId="2707155307" sldId="282"/>
+            <ac:spMk id="3" creationId="{87D5925C-1C7D-45C5-C112-09BC738A1C7F}"/>
+          </ac:spMkLst>
+        </pc:spChg>
+        <pc:picChg chg="add mod ord">
+          <ac:chgData name="Eduardo Savian" userId="83fefb37af455394" providerId="LiveId" clId="{C0BAD29C-331F-4880-BE27-02788087E9E9}" dt="2024-06-19T02:19:05.270" v="444" actId="22"/>
+          <ac:picMkLst>
+            <pc:docMk/>
+            <pc:sldMk cId="2707155307" sldId="282"/>
+            <ac:picMk id="8" creationId="{5FD4B0F7-AA97-BE6C-C927-490733EE9CAE}"/>
+          </ac:picMkLst>
+        </pc:picChg>
+      </pc:sldChg>
+      <pc:sldChg chg="addSp delSp modSp new mod">
+        <pc:chgData name="Eduardo Savian" userId="83fefb37af455394" providerId="LiveId" clId="{C0BAD29C-331F-4880-BE27-02788087E9E9}" dt="2024-06-19T02:20:06.668" v="454"/>
+        <pc:sldMkLst>
+          <pc:docMk/>
+          <pc:sldMk cId="3325068316" sldId="283"/>
+        </pc:sldMkLst>
+        <pc:spChg chg="mod">
+          <ac:chgData name="Eduardo Savian" userId="83fefb37af455394" providerId="LiveId" clId="{C0BAD29C-331F-4880-BE27-02788087E9E9}" dt="2024-06-19T02:20:06.668" v="454"/>
+          <ac:spMkLst>
+            <pc:docMk/>
+            <pc:sldMk cId="3325068316" sldId="283"/>
+            <ac:spMk id="2" creationId="{CCEC0EA6-22C1-0FD7-A031-82C300A98F3E}"/>
+          </ac:spMkLst>
+        </pc:spChg>
+        <pc:spChg chg="del mod">
+          <ac:chgData name="Eduardo Savian" userId="83fefb37af455394" providerId="LiveId" clId="{C0BAD29C-331F-4880-BE27-02788087E9E9}" dt="2024-06-19T02:19:39.730" v="449" actId="22"/>
+          <ac:spMkLst>
+            <pc:docMk/>
+            <pc:sldMk cId="3325068316" sldId="283"/>
+            <ac:spMk id="3" creationId="{960C86CA-87ED-F109-82A1-D9CA7C50895B}"/>
+          </ac:spMkLst>
+        </pc:spChg>
+        <pc:picChg chg="add mod ord">
+          <ac:chgData name="Eduardo Savian" userId="83fefb37af455394" providerId="LiveId" clId="{C0BAD29C-331F-4880-BE27-02788087E9E9}" dt="2024-06-19T02:19:39.730" v="449" actId="22"/>
+          <ac:picMkLst>
+            <pc:docMk/>
+            <pc:sldMk cId="3325068316" sldId="283"/>
+            <ac:picMk id="8" creationId="{95302D35-68A3-E70F-CF1B-F491A00FD9B6}"/>
+          </ac:picMkLst>
+        </pc:picChg>
+      </pc:sldChg>
+      <pc:sldChg chg="addSp delSp modSp new mod">
+        <pc:chgData name="Eduardo Savian" userId="83fefb37af455394" providerId="LiveId" clId="{C0BAD29C-331F-4880-BE27-02788087E9E9}" dt="2024-06-19T02:20:08.632" v="455"/>
+        <pc:sldMkLst>
+          <pc:docMk/>
+          <pc:sldMk cId="2287349985" sldId="284"/>
+        </pc:sldMkLst>
+        <pc:spChg chg="mod">
+          <ac:chgData name="Eduardo Savian" userId="83fefb37af455394" providerId="LiveId" clId="{C0BAD29C-331F-4880-BE27-02788087E9E9}" dt="2024-06-19T02:20:08.632" v="455"/>
+          <ac:spMkLst>
+            <pc:docMk/>
+            <pc:sldMk cId="2287349985" sldId="284"/>
+            <ac:spMk id="2" creationId="{5B56DE07-A52E-7B0C-ABC4-A3E924322AEE}"/>
+          </ac:spMkLst>
+        </pc:spChg>
+        <pc:spChg chg="del">
+          <ac:chgData name="Eduardo Savian" userId="83fefb37af455394" providerId="LiveId" clId="{C0BAD29C-331F-4880-BE27-02788087E9E9}" dt="2024-06-19T02:19:55.375" v="451" actId="22"/>
+          <ac:spMkLst>
+            <pc:docMk/>
+            <pc:sldMk cId="2287349985" sldId="284"/>
+            <ac:spMk id="3" creationId="{26628598-57E0-90EB-42AF-DAD7EAA7458C}"/>
+          </ac:spMkLst>
+        </pc:spChg>
+        <pc:picChg chg="add mod ord">
+          <ac:chgData name="Eduardo Savian" userId="83fefb37af455394" providerId="LiveId" clId="{C0BAD29C-331F-4880-BE27-02788087E9E9}" dt="2024-06-19T02:19:55.375" v="451" actId="22"/>
+          <ac:picMkLst>
+            <pc:docMk/>
+            <pc:sldMk cId="2287349985" sldId="284"/>
+            <ac:picMk id="8" creationId="{EF91F902-2307-EB37-3E5B-F98EB7BDA921}"/>
+          </ac:picMkLst>
+        </pc:picChg>
+      </pc:sldChg>
+      <pc:sldChg chg="new del">
+        <pc:chgData name="Eduardo Savian" userId="83fefb37af455394" providerId="LiveId" clId="{C0BAD29C-331F-4880-BE27-02788087E9E9}" dt="2024-06-19T02:21:41.419" v="466" actId="2696"/>
+        <pc:sldMkLst>
+          <pc:docMk/>
+          <pc:sldMk cId="2953710764" sldId="285"/>
         </pc:sldMkLst>
       </pc:sldChg>
     </pc:docChg>
@@ -7555,6 +8007,1979 @@
 </p:sld>
 </file>
 
+<file path=ppt/slides/slide10.xml><?xml version="1.0" encoding="utf-8"?>
+<p:sld xmlns:a="http://schemas.openxmlformats.org/drawingml/2006/main" xmlns:r="http://schemas.openxmlformats.org/officeDocument/2006/relationships" xmlns:p="http://schemas.openxmlformats.org/presentationml/2006/main">
+  <p:cSld>
+    <p:spTree>
+      <p:nvGrpSpPr>
+        <p:cNvPr id="1" name=""/>
+        <p:cNvGrpSpPr/>
+        <p:nvPr/>
+      </p:nvGrpSpPr>
+      <p:grpSpPr>
+        <a:xfrm>
+          <a:off x="0" y="0"/>
+          <a:ext cx="0" cy="0"/>
+          <a:chOff x="0" y="0"/>
+          <a:chExt cx="0" cy="0"/>
+        </a:xfrm>
+      </p:grpSpPr>
+      <p:sp>
+        <p:nvSpPr>
+          <p:cNvPr id="2" name="Título 1">
+            <a:extLst>
+              <a:ext uri="{FF2B5EF4-FFF2-40B4-BE49-F238E27FC236}">
+                <a16:creationId xmlns:a16="http://schemas.microsoft.com/office/drawing/2014/main" id="{72540168-690A-37A3-E7DF-CE9E07425A35}"/>
+              </a:ext>
+            </a:extLst>
+          </p:cNvPr>
+          <p:cNvSpPr>
+            <a:spLocks noGrp="1"/>
+          </p:cNvSpPr>
+          <p:nvPr>
+            <p:ph type="title"/>
+          </p:nvPr>
+        </p:nvSpPr>
+        <p:spPr/>
+        <p:txBody>
+          <a:bodyPr/>
+          <a:lstStyle/>
+          <a:p>
+            <a:r>
+              <a:rPr lang="pt-BR"/>
+              <a:t>Grafo</a:t>
+            </a:r>
+            <a:endParaRPr lang="pt-BR" dirty="0"/>
+          </a:p>
+        </p:txBody>
+      </p:sp>
+      <p:sp>
+        <p:nvSpPr>
+          <p:cNvPr id="4" name="Espaço Reservado para Data 3">
+            <a:extLst>
+              <a:ext uri="{FF2B5EF4-FFF2-40B4-BE49-F238E27FC236}">
+                <a16:creationId xmlns:a16="http://schemas.microsoft.com/office/drawing/2014/main" id="{09BF8850-3B0D-264C-1F68-170B6332FBEA}"/>
+              </a:ext>
+            </a:extLst>
+          </p:cNvPr>
+          <p:cNvSpPr>
+            <a:spLocks noGrp="1"/>
+          </p:cNvSpPr>
+          <p:nvPr>
+            <p:ph type="dt" sz="half" idx="10"/>
+          </p:nvPr>
+        </p:nvSpPr>
+        <p:spPr/>
+        <p:txBody>
+          <a:bodyPr/>
+          <a:lstStyle/>
+          <a:p>
+            <a:fld id="{804C12D4-F0C4-44A2-9DFB-3E890510E53E}" type="datetime1">
+              <a:rPr lang="en-US" smtClean="0"/>
+              <a:t>6/18/2024</a:t>
+            </a:fld>
+            <a:endParaRPr lang="en-US"/>
+          </a:p>
+        </p:txBody>
+      </p:sp>
+      <p:sp>
+        <p:nvSpPr>
+          <p:cNvPr id="5" name="Espaço Reservado para Rodapé 4">
+            <a:extLst>
+              <a:ext uri="{FF2B5EF4-FFF2-40B4-BE49-F238E27FC236}">
+                <a16:creationId xmlns:a16="http://schemas.microsoft.com/office/drawing/2014/main" id="{37ED183A-4C07-A9D8-B202-69DD13FC653B}"/>
+              </a:ext>
+            </a:extLst>
+          </p:cNvPr>
+          <p:cNvSpPr>
+            <a:spLocks noGrp="1"/>
+          </p:cNvSpPr>
+          <p:nvPr>
+            <p:ph type="ftr" sz="quarter" idx="11"/>
+          </p:nvPr>
+        </p:nvSpPr>
+        <p:spPr/>
+        <p:txBody>
+          <a:bodyPr/>
+          <a:lstStyle/>
+          <a:p>
+            <a:r>
+              <a:rPr lang="en-US"/>
+              <a:t>
+              </a:t>
+            </a:r>
+          </a:p>
+        </p:txBody>
+      </p:sp>
+      <p:sp>
+        <p:nvSpPr>
+          <p:cNvPr id="6" name="Espaço Reservado para Número de Slide 5">
+            <a:extLst>
+              <a:ext uri="{FF2B5EF4-FFF2-40B4-BE49-F238E27FC236}">
+                <a16:creationId xmlns:a16="http://schemas.microsoft.com/office/drawing/2014/main" id="{251D35ED-FB46-CBF5-372F-844D6D00F563}"/>
+              </a:ext>
+            </a:extLst>
+          </p:cNvPr>
+          <p:cNvSpPr>
+            <a:spLocks noGrp="1"/>
+          </p:cNvSpPr>
+          <p:nvPr>
+            <p:ph type="sldNum" sz="quarter" idx="12"/>
+          </p:nvPr>
+        </p:nvSpPr>
+        <p:spPr/>
+        <p:txBody>
+          <a:bodyPr/>
+          <a:lstStyle/>
+          <a:p>
+            <a:fld id="{E30AF5A0-43BB-4336-8627-9123B9144D80}" type="slidenum">
+              <a:rPr lang="en-US" smtClean="0"/>
+              <a:t>10</a:t>
+            </a:fld>
+            <a:endParaRPr lang="en-US"/>
+          </a:p>
+        </p:txBody>
+      </p:sp>
+      <p:pic>
+        <p:nvPicPr>
+          <p:cNvPr id="12" name="Espaço Reservado para Conteúdo 11">
+            <a:extLst>
+              <a:ext uri="{FF2B5EF4-FFF2-40B4-BE49-F238E27FC236}">
+                <a16:creationId xmlns:a16="http://schemas.microsoft.com/office/drawing/2014/main" id="{5A4C757B-6803-E038-4398-6F3D97F5288C}"/>
+              </a:ext>
+            </a:extLst>
+          </p:cNvPr>
+          <p:cNvPicPr>
+            <a:picLocks noGrp="1" noChangeAspect="1"/>
+          </p:cNvPicPr>
+          <p:nvPr>
+            <p:ph idx="1"/>
+          </p:nvPr>
+        </p:nvPicPr>
+        <p:blipFill>
+          <a:blip r:embed="rId2"/>
+          <a:stretch>
+            <a:fillRect/>
+          </a:stretch>
+        </p:blipFill>
+        <p:spPr>
+          <a:xfrm>
+            <a:off x="1591575" y="2292350"/>
+            <a:ext cx="8908838" cy="3636963"/>
+          </a:xfrm>
+        </p:spPr>
+      </p:pic>
+    </p:spTree>
+    <p:extLst>
+      <p:ext uri="{BB962C8B-B14F-4D97-AF65-F5344CB8AC3E}">
+        <p14:creationId xmlns:p14="http://schemas.microsoft.com/office/powerpoint/2010/main" val="3523369083"/>
+      </p:ext>
+    </p:extLst>
+  </p:cSld>
+  <p:clrMapOvr>
+    <a:masterClrMapping/>
+  </p:clrMapOvr>
+</p:sld>
+</file>
+
+<file path=ppt/slides/slide11.xml><?xml version="1.0" encoding="utf-8"?>
+<p:sld xmlns:a="http://schemas.openxmlformats.org/drawingml/2006/main" xmlns:r="http://schemas.openxmlformats.org/officeDocument/2006/relationships" xmlns:p="http://schemas.openxmlformats.org/presentationml/2006/main">
+  <p:cSld>
+    <p:spTree>
+      <p:nvGrpSpPr>
+        <p:cNvPr id="1" name=""/>
+        <p:cNvGrpSpPr/>
+        <p:nvPr/>
+      </p:nvGrpSpPr>
+      <p:grpSpPr>
+        <a:xfrm>
+          <a:off x="0" y="0"/>
+          <a:ext cx="0" cy="0"/>
+          <a:chOff x="0" y="0"/>
+          <a:chExt cx="0" cy="0"/>
+        </a:xfrm>
+      </p:grpSpPr>
+      <p:sp>
+        <p:nvSpPr>
+          <p:cNvPr id="2" name="Título 1">
+            <a:extLst>
+              <a:ext uri="{FF2B5EF4-FFF2-40B4-BE49-F238E27FC236}">
+                <a16:creationId xmlns:a16="http://schemas.microsoft.com/office/drawing/2014/main" id="{46EEE6C0-874C-DBBC-0A05-CFC3B25748E2}"/>
+              </a:ext>
+            </a:extLst>
+          </p:cNvPr>
+          <p:cNvSpPr>
+            <a:spLocks noGrp="1"/>
+          </p:cNvSpPr>
+          <p:nvPr>
+            <p:ph type="title"/>
+          </p:nvPr>
+        </p:nvSpPr>
+        <p:spPr/>
+        <p:txBody>
+          <a:bodyPr/>
+          <a:lstStyle/>
+          <a:p>
+            <a:r>
+              <a:rPr lang="pt-BR" dirty="0" err="1"/>
+              <a:t>Pseudo-código</a:t>
+            </a:r>
+            <a:endParaRPr lang="pt-BR" dirty="0"/>
+          </a:p>
+        </p:txBody>
+      </p:sp>
+      <p:pic>
+        <p:nvPicPr>
+          <p:cNvPr id="8" name="Espaço Reservado para Conteúdo 7">
+            <a:extLst>
+              <a:ext uri="{FF2B5EF4-FFF2-40B4-BE49-F238E27FC236}">
+                <a16:creationId xmlns:a16="http://schemas.microsoft.com/office/drawing/2014/main" id="{B84365D3-41D7-B117-0C3A-76323D9CE944}"/>
+              </a:ext>
+            </a:extLst>
+          </p:cNvPr>
+          <p:cNvPicPr>
+            <a:picLocks noGrp="1" noChangeAspect="1"/>
+          </p:cNvPicPr>
+          <p:nvPr>
+            <p:ph idx="1"/>
+          </p:nvPr>
+        </p:nvPicPr>
+        <p:blipFill>
+          <a:blip r:embed="rId2"/>
+          <a:stretch>
+            <a:fillRect/>
+          </a:stretch>
+        </p:blipFill>
+        <p:spPr>
+          <a:xfrm>
+            <a:off x="3947746" y="2292350"/>
+            <a:ext cx="4196495" cy="3636963"/>
+          </a:xfrm>
+        </p:spPr>
+      </p:pic>
+      <p:sp>
+        <p:nvSpPr>
+          <p:cNvPr id="4" name="Espaço Reservado para Data 3">
+            <a:extLst>
+              <a:ext uri="{FF2B5EF4-FFF2-40B4-BE49-F238E27FC236}">
+                <a16:creationId xmlns:a16="http://schemas.microsoft.com/office/drawing/2014/main" id="{75E0A7D2-592B-B21F-DD00-4184C5F3851B}"/>
+              </a:ext>
+            </a:extLst>
+          </p:cNvPr>
+          <p:cNvSpPr>
+            <a:spLocks noGrp="1"/>
+          </p:cNvSpPr>
+          <p:nvPr>
+            <p:ph type="dt" sz="half" idx="10"/>
+          </p:nvPr>
+        </p:nvSpPr>
+        <p:spPr/>
+        <p:txBody>
+          <a:bodyPr/>
+          <a:lstStyle/>
+          <a:p>
+            <a:fld id="{82CA5CC8-1E59-48C3-98CF-F5181DA67B1C}" type="datetime1">
+              <a:rPr lang="en-US" smtClean="0"/>
+              <a:t>6/18/2024</a:t>
+            </a:fld>
+            <a:endParaRPr lang="en-US"/>
+          </a:p>
+        </p:txBody>
+      </p:sp>
+      <p:sp>
+        <p:nvSpPr>
+          <p:cNvPr id="5" name="Espaço Reservado para Rodapé 4">
+            <a:extLst>
+              <a:ext uri="{FF2B5EF4-FFF2-40B4-BE49-F238E27FC236}">
+                <a16:creationId xmlns:a16="http://schemas.microsoft.com/office/drawing/2014/main" id="{4B6A0E27-B584-EF81-D999-64872AC03198}"/>
+              </a:ext>
+            </a:extLst>
+          </p:cNvPr>
+          <p:cNvSpPr>
+            <a:spLocks noGrp="1"/>
+          </p:cNvSpPr>
+          <p:nvPr>
+            <p:ph type="ftr" sz="quarter" idx="11"/>
+          </p:nvPr>
+        </p:nvSpPr>
+        <p:spPr/>
+        <p:txBody>
+          <a:bodyPr/>
+          <a:lstStyle/>
+          <a:p>
+            <a:r>
+              <a:rPr lang="en-US"/>
+              <a:t>
+              </a:t>
+            </a:r>
+          </a:p>
+        </p:txBody>
+      </p:sp>
+      <p:sp>
+        <p:nvSpPr>
+          <p:cNvPr id="6" name="Espaço Reservado para Número de Slide 5">
+            <a:extLst>
+              <a:ext uri="{FF2B5EF4-FFF2-40B4-BE49-F238E27FC236}">
+                <a16:creationId xmlns:a16="http://schemas.microsoft.com/office/drawing/2014/main" id="{416A80E7-3670-8B1F-1F48-F405A56D4AA5}"/>
+              </a:ext>
+            </a:extLst>
+          </p:cNvPr>
+          <p:cNvSpPr>
+            <a:spLocks noGrp="1"/>
+          </p:cNvSpPr>
+          <p:nvPr>
+            <p:ph type="sldNum" sz="quarter" idx="12"/>
+          </p:nvPr>
+        </p:nvSpPr>
+        <p:spPr/>
+        <p:txBody>
+          <a:bodyPr/>
+          <a:lstStyle/>
+          <a:p>
+            <a:fld id="{E30AF5A0-43BB-4336-8627-9123B9144D80}" type="slidenum">
+              <a:rPr lang="en-US" smtClean="0"/>
+              <a:t>11</a:t>
+            </a:fld>
+            <a:endParaRPr lang="en-US"/>
+          </a:p>
+        </p:txBody>
+      </p:sp>
+    </p:spTree>
+    <p:extLst>
+      <p:ext uri="{BB962C8B-B14F-4D97-AF65-F5344CB8AC3E}">
+        <p14:creationId xmlns:p14="http://schemas.microsoft.com/office/powerpoint/2010/main" val="642999662"/>
+      </p:ext>
+    </p:extLst>
+  </p:cSld>
+  <p:clrMapOvr>
+    <a:masterClrMapping/>
+  </p:clrMapOvr>
+</p:sld>
+</file>
+
+<file path=ppt/slides/slide12.xml><?xml version="1.0" encoding="utf-8"?>
+<p:sld xmlns:a="http://schemas.openxmlformats.org/drawingml/2006/main" xmlns:r="http://schemas.openxmlformats.org/officeDocument/2006/relationships" xmlns:p="http://schemas.openxmlformats.org/presentationml/2006/main">
+  <p:cSld>
+    <p:spTree>
+      <p:nvGrpSpPr>
+        <p:cNvPr id="1" name=""/>
+        <p:cNvGrpSpPr/>
+        <p:nvPr/>
+      </p:nvGrpSpPr>
+      <p:grpSpPr>
+        <a:xfrm>
+          <a:off x="0" y="0"/>
+          <a:ext cx="0" cy="0"/>
+          <a:chOff x="0" y="0"/>
+          <a:chExt cx="0" cy="0"/>
+        </a:xfrm>
+      </p:grpSpPr>
+      <p:sp>
+        <p:nvSpPr>
+          <p:cNvPr id="2" name="Título 1">
+            <a:extLst>
+              <a:ext uri="{FF2B5EF4-FFF2-40B4-BE49-F238E27FC236}">
+                <a16:creationId xmlns:a16="http://schemas.microsoft.com/office/drawing/2014/main" id="{5B2A0EA0-A363-FEA4-4CD4-4A76C4624E68}"/>
+              </a:ext>
+            </a:extLst>
+          </p:cNvPr>
+          <p:cNvSpPr>
+            <a:spLocks noGrp="1"/>
+          </p:cNvSpPr>
+          <p:nvPr>
+            <p:ph type="title"/>
+          </p:nvPr>
+        </p:nvSpPr>
+        <p:spPr/>
+        <p:txBody>
+          <a:bodyPr/>
+          <a:lstStyle/>
+          <a:p>
+            <a:r>
+              <a:rPr lang="pt-BR" dirty="0" err="1"/>
+              <a:t>Pseudo-código</a:t>
+            </a:r>
+            <a:endParaRPr lang="pt-BR" dirty="0"/>
+          </a:p>
+        </p:txBody>
+      </p:sp>
+      <p:pic>
+        <p:nvPicPr>
+          <p:cNvPr id="8" name="Espaço Reservado para Conteúdo 7">
+            <a:extLst>
+              <a:ext uri="{FF2B5EF4-FFF2-40B4-BE49-F238E27FC236}">
+                <a16:creationId xmlns:a16="http://schemas.microsoft.com/office/drawing/2014/main" id="{7CD76E04-D522-973B-6EE1-A40171303F89}"/>
+              </a:ext>
+            </a:extLst>
+          </p:cNvPr>
+          <p:cNvPicPr>
+            <a:picLocks noGrp="1" noChangeAspect="1"/>
+          </p:cNvPicPr>
+          <p:nvPr>
+            <p:ph idx="1"/>
+          </p:nvPr>
+        </p:nvPicPr>
+        <p:blipFill>
+          <a:blip r:embed="rId2"/>
+          <a:stretch>
+            <a:fillRect/>
+          </a:stretch>
+        </p:blipFill>
+        <p:spPr>
+          <a:xfrm>
+            <a:off x="4116096" y="2292350"/>
+            <a:ext cx="3859796" cy="3636963"/>
+          </a:xfrm>
+        </p:spPr>
+      </p:pic>
+      <p:sp>
+        <p:nvSpPr>
+          <p:cNvPr id="4" name="Espaço Reservado para Data 3">
+            <a:extLst>
+              <a:ext uri="{FF2B5EF4-FFF2-40B4-BE49-F238E27FC236}">
+                <a16:creationId xmlns:a16="http://schemas.microsoft.com/office/drawing/2014/main" id="{F1169171-50F6-26B7-CA51-7B4A8C668F9C}"/>
+              </a:ext>
+            </a:extLst>
+          </p:cNvPr>
+          <p:cNvSpPr>
+            <a:spLocks noGrp="1"/>
+          </p:cNvSpPr>
+          <p:nvPr>
+            <p:ph type="dt" sz="half" idx="10"/>
+          </p:nvPr>
+        </p:nvSpPr>
+        <p:spPr/>
+        <p:txBody>
+          <a:bodyPr/>
+          <a:lstStyle/>
+          <a:p>
+            <a:fld id="{3FED1A3B-AF4E-49AD-AF70-B4B048A9E2A4}" type="datetime1">
+              <a:rPr lang="en-US" smtClean="0"/>
+              <a:t>6/18/2024</a:t>
+            </a:fld>
+            <a:endParaRPr lang="en-US"/>
+          </a:p>
+        </p:txBody>
+      </p:sp>
+      <p:sp>
+        <p:nvSpPr>
+          <p:cNvPr id="5" name="Espaço Reservado para Rodapé 4">
+            <a:extLst>
+              <a:ext uri="{FF2B5EF4-FFF2-40B4-BE49-F238E27FC236}">
+                <a16:creationId xmlns:a16="http://schemas.microsoft.com/office/drawing/2014/main" id="{1D8C1A4C-1C25-FF6D-B647-44B070F2B3B9}"/>
+              </a:ext>
+            </a:extLst>
+          </p:cNvPr>
+          <p:cNvSpPr>
+            <a:spLocks noGrp="1"/>
+          </p:cNvSpPr>
+          <p:nvPr>
+            <p:ph type="ftr" sz="quarter" idx="11"/>
+          </p:nvPr>
+        </p:nvSpPr>
+        <p:spPr/>
+        <p:txBody>
+          <a:bodyPr/>
+          <a:lstStyle/>
+          <a:p>
+            <a:r>
+              <a:rPr lang="en-US"/>
+              <a:t>
+              </a:t>
+            </a:r>
+          </a:p>
+        </p:txBody>
+      </p:sp>
+      <p:sp>
+        <p:nvSpPr>
+          <p:cNvPr id="6" name="Espaço Reservado para Número de Slide 5">
+            <a:extLst>
+              <a:ext uri="{FF2B5EF4-FFF2-40B4-BE49-F238E27FC236}">
+                <a16:creationId xmlns:a16="http://schemas.microsoft.com/office/drawing/2014/main" id="{9702997B-5C0B-F2E4-BB6F-65DB8CF1421D}"/>
+              </a:ext>
+            </a:extLst>
+          </p:cNvPr>
+          <p:cNvSpPr>
+            <a:spLocks noGrp="1"/>
+          </p:cNvSpPr>
+          <p:nvPr>
+            <p:ph type="sldNum" sz="quarter" idx="12"/>
+          </p:nvPr>
+        </p:nvSpPr>
+        <p:spPr/>
+        <p:txBody>
+          <a:bodyPr/>
+          <a:lstStyle/>
+          <a:p>
+            <a:fld id="{E30AF5A0-43BB-4336-8627-9123B9144D80}" type="slidenum">
+              <a:rPr lang="en-US" smtClean="0"/>
+              <a:t>12</a:t>
+            </a:fld>
+            <a:endParaRPr lang="en-US"/>
+          </a:p>
+        </p:txBody>
+      </p:sp>
+    </p:spTree>
+    <p:extLst>
+      <p:ext uri="{BB962C8B-B14F-4D97-AF65-F5344CB8AC3E}">
+        <p14:creationId xmlns:p14="http://schemas.microsoft.com/office/powerpoint/2010/main" val="2061843158"/>
+      </p:ext>
+    </p:extLst>
+  </p:cSld>
+  <p:clrMapOvr>
+    <a:masterClrMapping/>
+  </p:clrMapOvr>
+</p:sld>
+</file>
+
+<file path=ppt/slides/slide13.xml><?xml version="1.0" encoding="utf-8"?>
+<p:sld xmlns:a="http://schemas.openxmlformats.org/drawingml/2006/main" xmlns:r="http://schemas.openxmlformats.org/officeDocument/2006/relationships" xmlns:p="http://schemas.openxmlformats.org/presentationml/2006/main">
+  <p:cSld>
+    <p:spTree>
+      <p:nvGrpSpPr>
+        <p:cNvPr id="1" name=""/>
+        <p:cNvGrpSpPr/>
+        <p:nvPr/>
+      </p:nvGrpSpPr>
+      <p:grpSpPr>
+        <a:xfrm>
+          <a:off x="0" y="0"/>
+          <a:ext cx="0" cy="0"/>
+          <a:chOff x="0" y="0"/>
+          <a:chExt cx="0" cy="0"/>
+        </a:xfrm>
+      </p:grpSpPr>
+      <p:sp>
+        <p:nvSpPr>
+          <p:cNvPr id="2" name="Título 1">
+            <a:extLst>
+              <a:ext uri="{FF2B5EF4-FFF2-40B4-BE49-F238E27FC236}">
+                <a16:creationId xmlns:a16="http://schemas.microsoft.com/office/drawing/2014/main" id="{B181ADD0-7F40-AA4C-FCFF-A8DFD2B35DA6}"/>
+              </a:ext>
+            </a:extLst>
+          </p:cNvPr>
+          <p:cNvSpPr>
+            <a:spLocks noGrp="1"/>
+          </p:cNvSpPr>
+          <p:nvPr>
+            <p:ph type="title"/>
+          </p:nvPr>
+        </p:nvSpPr>
+        <p:spPr/>
+        <p:txBody>
+          <a:bodyPr/>
+          <a:lstStyle/>
+          <a:p>
+            <a:r>
+              <a:rPr lang="pt-BR" dirty="0" err="1"/>
+              <a:t>Pseudo-código</a:t>
+            </a:r>
+            <a:endParaRPr lang="pt-BR" dirty="0"/>
+          </a:p>
+        </p:txBody>
+      </p:sp>
+      <p:pic>
+        <p:nvPicPr>
+          <p:cNvPr id="8" name="Espaço Reservado para Conteúdo 7">
+            <a:extLst>
+              <a:ext uri="{FF2B5EF4-FFF2-40B4-BE49-F238E27FC236}">
+                <a16:creationId xmlns:a16="http://schemas.microsoft.com/office/drawing/2014/main" id="{7608FD13-E51A-6B6E-957F-4F3A152E63BE}"/>
+              </a:ext>
+            </a:extLst>
+          </p:cNvPr>
+          <p:cNvPicPr>
+            <a:picLocks noGrp="1" noChangeAspect="1"/>
+          </p:cNvPicPr>
+          <p:nvPr>
+            <p:ph idx="1"/>
+          </p:nvPr>
+        </p:nvPicPr>
+        <p:blipFill>
+          <a:blip r:embed="rId2"/>
+          <a:stretch>
+            <a:fillRect/>
+          </a:stretch>
+        </p:blipFill>
+        <p:spPr>
+          <a:xfrm>
+            <a:off x="2565518" y="2292350"/>
+            <a:ext cx="6960952" cy="3636963"/>
+          </a:xfrm>
+        </p:spPr>
+      </p:pic>
+      <p:sp>
+        <p:nvSpPr>
+          <p:cNvPr id="4" name="Espaço Reservado para Data 3">
+            <a:extLst>
+              <a:ext uri="{FF2B5EF4-FFF2-40B4-BE49-F238E27FC236}">
+                <a16:creationId xmlns:a16="http://schemas.microsoft.com/office/drawing/2014/main" id="{9DD137EA-0D02-C6A4-510C-4ED81261E4E3}"/>
+              </a:ext>
+            </a:extLst>
+          </p:cNvPr>
+          <p:cNvSpPr>
+            <a:spLocks noGrp="1"/>
+          </p:cNvSpPr>
+          <p:nvPr>
+            <p:ph type="dt" sz="half" idx="10"/>
+          </p:nvPr>
+        </p:nvSpPr>
+        <p:spPr/>
+        <p:txBody>
+          <a:bodyPr/>
+          <a:lstStyle/>
+          <a:p>
+            <a:fld id="{19EBF08E-4C68-4F76-ACBE-10C8B68D8815}" type="datetime1">
+              <a:rPr lang="en-US" smtClean="0"/>
+              <a:t>6/18/2024</a:t>
+            </a:fld>
+            <a:endParaRPr lang="en-US"/>
+          </a:p>
+        </p:txBody>
+      </p:sp>
+      <p:sp>
+        <p:nvSpPr>
+          <p:cNvPr id="5" name="Espaço Reservado para Rodapé 4">
+            <a:extLst>
+              <a:ext uri="{FF2B5EF4-FFF2-40B4-BE49-F238E27FC236}">
+                <a16:creationId xmlns:a16="http://schemas.microsoft.com/office/drawing/2014/main" id="{565395CF-B44C-D1F4-0BF1-DBEFBDBE9B2A}"/>
+              </a:ext>
+            </a:extLst>
+          </p:cNvPr>
+          <p:cNvSpPr>
+            <a:spLocks noGrp="1"/>
+          </p:cNvSpPr>
+          <p:nvPr>
+            <p:ph type="ftr" sz="quarter" idx="11"/>
+          </p:nvPr>
+        </p:nvSpPr>
+        <p:spPr/>
+        <p:txBody>
+          <a:bodyPr/>
+          <a:lstStyle/>
+          <a:p>
+            <a:r>
+              <a:rPr lang="en-US"/>
+              <a:t>
+              </a:t>
+            </a:r>
+          </a:p>
+        </p:txBody>
+      </p:sp>
+      <p:sp>
+        <p:nvSpPr>
+          <p:cNvPr id="6" name="Espaço Reservado para Número de Slide 5">
+            <a:extLst>
+              <a:ext uri="{FF2B5EF4-FFF2-40B4-BE49-F238E27FC236}">
+                <a16:creationId xmlns:a16="http://schemas.microsoft.com/office/drawing/2014/main" id="{1D782E9B-1AE2-7D16-BAB6-4AD2D1C100A6}"/>
+              </a:ext>
+            </a:extLst>
+          </p:cNvPr>
+          <p:cNvSpPr>
+            <a:spLocks noGrp="1"/>
+          </p:cNvSpPr>
+          <p:nvPr>
+            <p:ph type="sldNum" sz="quarter" idx="12"/>
+          </p:nvPr>
+        </p:nvSpPr>
+        <p:spPr/>
+        <p:txBody>
+          <a:bodyPr/>
+          <a:lstStyle/>
+          <a:p>
+            <a:fld id="{E30AF5A0-43BB-4336-8627-9123B9144D80}" type="slidenum">
+              <a:rPr lang="en-US" smtClean="0"/>
+              <a:t>13</a:t>
+            </a:fld>
+            <a:endParaRPr lang="en-US"/>
+          </a:p>
+        </p:txBody>
+      </p:sp>
+    </p:spTree>
+    <p:extLst>
+      <p:ext uri="{BB962C8B-B14F-4D97-AF65-F5344CB8AC3E}">
+        <p14:creationId xmlns:p14="http://schemas.microsoft.com/office/powerpoint/2010/main" val="3452563875"/>
+      </p:ext>
+    </p:extLst>
+  </p:cSld>
+  <p:clrMapOvr>
+    <a:masterClrMapping/>
+  </p:clrMapOvr>
+</p:sld>
+</file>
+
+<file path=ppt/slides/slide14.xml><?xml version="1.0" encoding="utf-8"?>
+<p:sld xmlns:a="http://schemas.openxmlformats.org/drawingml/2006/main" xmlns:r="http://schemas.openxmlformats.org/officeDocument/2006/relationships" xmlns:p="http://schemas.openxmlformats.org/presentationml/2006/main">
+  <p:cSld>
+    <p:spTree>
+      <p:nvGrpSpPr>
+        <p:cNvPr id="1" name=""/>
+        <p:cNvGrpSpPr/>
+        <p:nvPr/>
+      </p:nvGrpSpPr>
+      <p:grpSpPr>
+        <a:xfrm>
+          <a:off x="0" y="0"/>
+          <a:ext cx="0" cy="0"/>
+          <a:chOff x="0" y="0"/>
+          <a:chExt cx="0" cy="0"/>
+        </a:xfrm>
+      </p:grpSpPr>
+      <p:sp>
+        <p:nvSpPr>
+          <p:cNvPr id="2" name="Título 1">
+            <a:extLst>
+              <a:ext uri="{FF2B5EF4-FFF2-40B4-BE49-F238E27FC236}">
+                <a16:creationId xmlns:a16="http://schemas.microsoft.com/office/drawing/2014/main" id="{2C7603AB-3635-A747-D72A-F657752D300B}"/>
+              </a:ext>
+            </a:extLst>
+          </p:cNvPr>
+          <p:cNvSpPr>
+            <a:spLocks noGrp="1"/>
+          </p:cNvSpPr>
+          <p:nvPr>
+            <p:ph type="title"/>
+          </p:nvPr>
+        </p:nvSpPr>
+        <p:spPr/>
+        <p:txBody>
+          <a:bodyPr/>
+          <a:lstStyle/>
+          <a:p>
+            <a:r>
+              <a:rPr lang="pt-BR" dirty="0" err="1"/>
+              <a:t>Pseudo-código</a:t>
+            </a:r>
+            <a:endParaRPr lang="pt-BR" dirty="0"/>
+          </a:p>
+        </p:txBody>
+      </p:sp>
+      <p:pic>
+        <p:nvPicPr>
+          <p:cNvPr id="8" name="Espaço Reservado para Conteúdo 7">
+            <a:extLst>
+              <a:ext uri="{FF2B5EF4-FFF2-40B4-BE49-F238E27FC236}">
+                <a16:creationId xmlns:a16="http://schemas.microsoft.com/office/drawing/2014/main" id="{5FD4B0F7-AA97-BE6C-C927-490733EE9CAE}"/>
+              </a:ext>
+            </a:extLst>
+          </p:cNvPr>
+          <p:cNvPicPr>
+            <a:picLocks noGrp="1" noChangeAspect="1"/>
+          </p:cNvPicPr>
+          <p:nvPr>
+            <p:ph idx="1"/>
+          </p:nvPr>
+        </p:nvPicPr>
+        <p:blipFill>
+          <a:blip r:embed="rId2"/>
+          <a:stretch>
+            <a:fillRect/>
+          </a:stretch>
+        </p:blipFill>
+        <p:spPr>
+          <a:xfrm>
+            <a:off x="3747817" y="2292350"/>
+            <a:ext cx="4596353" cy="3636963"/>
+          </a:xfrm>
+        </p:spPr>
+      </p:pic>
+      <p:sp>
+        <p:nvSpPr>
+          <p:cNvPr id="4" name="Espaço Reservado para Data 3">
+            <a:extLst>
+              <a:ext uri="{FF2B5EF4-FFF2-40B4-BE49-F238E27FC236}">
+                <a16:creationId xmlns:a16="http://schemas.microsoft.com/office/drawing/2014/main" id="{A019CC65-0C1B-91FD-987F-A5A74ABD9BFF}"/>
+              </a:ext>
+            </a:extLst>
+          </p:cNvPr>
+          <p:cNvSpPr>
+            <a:spLocks noGrp="1"/>
+          </p:cNvSpPr>
+          <p:nvPr>
+            <p:ph type="dt" sz="half" idx="10"/>
+          </p:nvPr>
+        </p:nvSpPr>
+        <p:spPr/>
+        <p:txBody>
+          <a:bodyPr/>
+          <a:lstStyle/>
+          <a:p>
+            <a:fld id="{37D58122-C5F7-47CD-801C-14F6A9A18FF8}" type="datetime1">
+              <a:rPr lang="en-US" smtClean="0"/>
+              <a:t>6/18/2024</a:t>
+            </a:fld>
+            <a:endParaRPr lang="en-US"/>
+          </a:p>
+        </p:txBody>
+      </p:sp>
+      <p:sp>
+        <p:nvSpPr>
+          <p:cNvPr id="5" name="Espaço Reservado para Rodapé 4">
+            <a:extLst>
+              <a:ext uri="{FF2B5EF4-FFF2-40B4-BE49-F238E27FC236}">
+                <a16:creationId xmlns:a16="http://schemas.microsoft.com/office/drawing/2014/main" id="{9F1DFAA1-6AD9-55CE-3FD8-DC93BDFAAC45}"/>
+              </a:ext>
+            </a:extLst>
+          </p:cNvPr>
+          <p:cNvSpPr>
+            <a:spLocks noGrp="1"/>
+          </p:cNvSpPr>
+          <p:nvPr>
+            <p:ph type="ftr" sz="quarter" idx="11"/>
+          </p:nvPr>
+        </p:nvSpPr>
+        <p:spPr/>
+        <p:txBody>
+          <a:bodyPr/>
+          <a:lstStyle/>
+          <a:p>
+            <a:r>
+              <a:rPr lang="en-US"/>
+              <a:t>
+              </a:t>
+            </a:r>
+          </a:p>
+        </p:txBody>
+      </p:sp>
+      <p:sp>
+        <p:nvSpPr>
+          <p:cNvPr id="6" name="Espaço Reservado para Número de Slide 5">
+            <a:extLst>
+              <a:ext uri="{FF2B5EF4-FFF2-40B4-BE49-F238E27FC236}">
+                <a16:creationId xmlns:a16="http://schemas.microsoft.com/office/drawing/2014/main" id="{9A9DD6B4-4469-2912-9ECC-C294C6A7F214}"/>
+              </a:ext>
+            </a:extLst>
+          </p:cNvPr>
+          <p:cNvSpPr>
+            <a:spLocks noGrp="1"/>
+          </p:cNvSpPr>
+          <p:nvPr>
+            <p:ph type="sldNum" sz="quarter" idx="12"/>
+          </p:nvPr>
+        </p:nvSpPr>
+        <p:spPr/>
+        <p:txBody>
+          <a:bodyPr/>
+          <a:lstStyle/>
+          <a:p>
+            <a:fld id="{E30AF5A0-43BB-4336-8627-9123B9144D80}" type="slidenum">
+              <a:rPr lang="en-US" smtClean="0"/>
+              <a:t>14</a:t>
+            </a:fld>
+            <a:endParaRPr lang="en-US"/>
+          </a:p>
+        </p:txBody>
+      </p:sp>
+    </p:spTree>
+    <p:extLst>
+      <p:ext uri="{BB962C8B-B14F-4D97-AF65-F5344CB8AC3E}">
+        <p14:creationId xmlns:p14="http://schemas.microsoft.com/office/powerpoint/2010/main" val="2707155307"/>
+      </p:ext>
+    </p:extLst>
+  </p:cSld>
+  <p:clrMapOvr>
+    <a:masterClrMapping/>
+  </p:clrMapOvr>
+</p:sld>
+</file>
+
+<file path=ppt/slides/slide15.xml><?xml version="1.0" encoding="utf-8"?>
+<p:sld xmlns:a="http://schemas.openxmlformats.org/drawingml/2006/main" xmlns:r="http://schemas.openxmlformats.org/officeDocument/2006/relationships" xmlns:p="http://schemas.openxmlformats.org/presentationml/2006/main">
+  <p:cSld>
+    <p:spTree>
+      <p:nvGrpSpPr>
+        <p:cNvPr id="1" name=""/>
+        <p:cNvGrpSpPr/>
+        <p:nvPr/>
+      </p:nvGrpSpPr>
+      <p:grpSpPr>
+        <a:xfrm>
+          <a:off x="0" y="0"/>
+          <a:ext cx="0" cy="0"/>
+          <a:chOff x="0" y="0"/>
+          <a:chExt cx="0" cy="0"/>
+        </a:xfrm>
+      </p:grpSpPr>
+      <p:sp>
+        <p:nvSpPr>
+          <p:cNvPr id="2" name="Título 1">
+            <a:extLst>
+              <a:ext uri="{FF2B5EF4-FFF2-40B4-BE49-F238E27FC236}">
+                <a16:creationId xmlns:a16="http://schemas.microsoft.com/office/drawing/2014/main" id="{CCEC0EA6-22C1-0FD7-A031-82C300A98F3E}"/>
+              </a:ext>
+            </a:extLst>
+          </p:cNvPr>
+          <p:cNvSpPr>
+            <a:spLocks noGrp="1"/>
+          </p:cNvSpPr>
+          <p:nvPr>
+            <p:ph type="title"/>
+          </p:nvPr>
+        </p:nvSpPr>
+        <p:spPr/>
+        <p:txBody>
+          <a:bodyPr/>
+          <a:lstStyle/>
+          <a:p>
+            <a:r>
+              <a:rPr lang="pt-BR" dirty="0" err="1"/>
+              <a:t>Pseudo-código</a:t>
+            </a:r>
+            <a:endParaRPr lang="pt-BR" dirty="0"/>
+          </a:p>
+        </p:txBody>
+      </p:sp>
+      <p:pic>
+        <p:nvPicPr>
+          <p:cNvPr id="8" name="Espaço Reservado para Conteúdo 7">
+            <a:extLst>
+              <a:ext uri="{FF2B5EF4-FFF2-40B4-BE49-F238E27FC236}">
+                <a16:creationId xmlns:a16="http://schemas.microsoft.com/office/drawing/2014/main" id="{95302D35-68A3-E70F-CF1B-F491A00FD9B6}"/>
+              </a:ext>
+            </a:extLst>
+          </p:cNvPr>
+          <p:cNvPicPr>
+            <a:picLocks noGrp="1" noChangeAspect="1"/>
+          </p:cNvPicPr>
+          <p:nvPr>
+            <p:ph idx="1"/>
+          </p:nvPr>
+        </p:nvPicPr>
+        <p:blipFill>
+          <a:blip r:embed="rId2"/>
+          <a:stretch>
+            <a:fillRect/>
+          </a:stretch>
+        </p:blipFill>
+        <p:spPr>
+          <a:xfrm>
+            <a:off x="3902293" y="2292350"/>
+            <a:ext cx="4287402" cy="3636963"/>
+          </a:xfrm>
+        </p:spPr>
+      </p:pic>
+      <p:sp>
+        <p:nvSpPr>
+          <p:cNvPr id="4" name="Espaço Reservado para Data 3">
+            <a:extLst>
+              <a:ext uri="{FF2B5EF4-FFF2-40B4-BE49-F238E27FC236}">
+                <a16:creationId xmlns:a16="http://schemas.microsoft.com/office/drawing/2014/main" id="{EFACD563-97C2-E351-DF86-2DFDCBD9E827}"/>
+              </a:ext>
+            </a:extLst>
+          </p:cNvPr>
+          <p:cNvSpPr>
+            <a:spLocks noGrp="1"/>
+          </p:cNvSpPr>
+          <p:nvPr>
+            <p:ph type="dt" sz="half" idx="10"/>
+          </p:nvPr>
+        </p:nvSpPr>
+        <p:spPr/>
+        <p:txBody>
+          <a:bodyPr/>
+          <a:lstStyle/>
+          <a:p>
+            <a:fld id="{80EB892E-AFAE-4AE9-8A01-B3069C9289F0}" type="datetime1">
+              <a:rPr lang="en-US" smtClean="0"/>
+              <a:t>6/18/2024</a:t>
+            </a:fld>
+            <a:endParaRPr lang="en-US"/>
+          </a:p>
+        </p:txBody>
+      </p:sp>
+      <p:sp>
+        <p:nvSpPr>
+          <p:cNvPr id="5" name="Espaço Reservado para Rodapé 4">
+            <a:extLst>
+              <a:ext uri="{FF2B5EF4-FFF2-40B4-BE49-F238E27FC236}">
+                <a16:creationId xmlns:a16="http://schemas.microsoft.com/office/drawing/2014/main" id="{DF48E822-B6F0-9680-B855-2963C6755F7C}"/>
+              </a:ext>
+            </a:extLst>
+          </p:cNvPr>
+          <p:cNvSpPr>
+            <a:spLocks noGrp="1"/>
+          </p:cNvSpPr>
+          <p:nvPr>
+            <p:ph type="ftr" sz="quarter" idx="11"/>
+          </p:nvPr>
+        </p:nvSpPr>
+        <p:spPr/>
+        <p:txBody>
+          <a:bodyPr/>
+          <a:lstStyle/>
+          <a:p>
+            <a:r>
+              <a:rPr lang="en-US"/>
+              <a:t>
+              </a:t>
+            </a:r>
+          </a:p>
+        </p:txBody>
+      </p:sp>
+      <p:sp>
+        <p:nvSpPr>
+          <p:cNvPr id="6" name="Espaço Reservado para Número de Slide 5">
+            <a:extLst>
+              <a:ext uri="{FF2B5EF4-FFF2-40B4-BE49-F238E27FC236}">
+                <a16:creationId xmlns:a16="http://schemas.microsoft.com/office/drawing/2014/main" id="{69E2FB12-A29C-67E3-E0D4-F1DA90D358DE}"/>
+              </a:ext>
+            </a:extLst>
+          </p:cNvPr>
+          <p:cNvSpPr>
+            <a:spLocks noGrp="1"/>
+          </p:cNvSpPr>
+          <p:nvPr>
+            <p:ph type="sldNum" sz="quarter" idx="12"/>
+          </p:nvPr>
+        </p:nvSpPr>
+        <p:spPr/>
+        <p:txBody>
+          <a:bodyPr/>
+          <a:lstStyle/>
+          <a:p>
+            <a:fld id="{E30AF5A0-43BB-4336-8627-9123B9144D80}" type="slidenum">
+              <a:rPr lang="en-US" smtClean="0"/>
+              <a:t>15</a:t>
+            </a:fld>
+            <a:endParaRPr lang="en-US"/>
+          </a:p>
+        </p:txBody>
+      </p:sp>
+    </p:spTree>
+    <p:extLst>
+      <p:ext uri="{BB962C8B-B14F-4D97-AF65-F5344CB8AC3E}">
+        <p14:creationId xmlns:p14="http://schemas.microsoft.com/office/powerpoint/2010/main" val="3325068316"/>
+      </p:ext>
+    </p:extLst>
+  </p:cSld>
+  <p:clrMapOvr>
+    <a:masterClrMapping/>
+  </p:clrMapOvr>
+</p:sld>
+</file>
+
+<file path=ppt/slides/slide16.xml><?xml version="1.0" encoding="utf-8"?>
+<p:sld xmlns:a="http://schemas.openxmlformats.org/drawingml/2006/main" xmlns:r="http://schemas.openxmlformats.org/officeDocument/2006/relationships" xmlns:p="http://schemas.openxmlformats.org/presentationml/2006/main">
+  <p:cSld>
+    <p:spTree>
+      <p:nvGrpSpPr>
+        <p:cNvPr id="1" name=""/>
+        <p:cNvGrpSpPr/>
+        <p:nvPr/>
+      </p:nvGrpSpPr>
+      <p:grpSpPr>
+        <a:xfrm>
+          <a:off x="0" y="0"/>
+          <a:ext cx="0" cy="0"/>
+          <a:chOff x="0" y="0"/>
+          <a:chExt cx="0" cy="0"/>
+        </a:xfrm>
+      </p:grpSpPr>
+      <p:sp>
+        <p:nvSpPr>
+          <p:cNvPr id="2" name="Título 1">
+            <a:extLst>
+              <a:ext uri="{FF2B5EF4-FFF2-40B4-BE49-F238E27FC236}">
+                <a16:creationId xmlns:a16="http://schemas.microsoft.com/office/drawing/2014/main" id="{5B56DE07-A52E-7B0C-ABC4-A3E924322AEE}"/>
+              </a:ext>
+            </a:extLst>
+          </p:cNvPr>
+          <p:cNvSpPr>
+            <a:spLocks noGrp="1"/>
+          </p:cNvSpPr>
+          <p:nvPr>
+            <p:ph type="title"/>
+          </p:nvPr>
+        </p:nvSpPr>
+        <p:spPr/>
+        <p:txBody>
+          <a:bodyPr/>
+          <a:lstStyle/>
+          <a:p>
+            <a:r>
+              <a:rPr lang="pt-BR" dirty="0" err="1"/>
+              <a:t>Pseudo-código</a:t>
+            </a:r>
+            <a:endParaRPr lang="pt-BR" dirty="0"/>
+          </a:p>
+        </p:txBody>
+      </p:sp>
+      <p:pic>
+        <p:nvPicPr>
+          <p:cNvPr id="8" name="Espaço Reservado para Conteúdo 7">
+            <a:extLst>
+              <a:ext uri="{FF2B5EF4-FFF2-40B4-BE49-F238E27FC236}">
+                <a16:creationId xmlns:a16="http://schemas.microsoft.com/office/drawing/2014/main" id="{EF91F902-2307-EB37-3E5B-F98EB7BDA921}"/>
+              </a:ext>
+            </a:extLst>
+          </p:cNvPr>
+          <p:cNvPicPr>
+            <a:picLocks noGrp="1" noChangeAspect="1"/>
+          </p:cNvPicPr>
+          <p:nvPr>
+            <p:ph idx="1"/>
+          </p:nvPr>
+        </p:nvPicPr>
+        <p:blipFill>
+          <a:blip r:embed="rId2"/>
+          <a:stretch>
+            <a:fillRect/>
+          </a:stretch>
+        </p:blipFill>
+        <p:spPr>
+          <a:xfrm>
+            <a:off x="2708275" y="2292350"/>
+            <a:ext cx="6675438" cy="3636963"/>
+          </a:xfrm>
+        </p:spPr>
+      </p:pic>
+      <p:sp>
+        <p:nvSpPr>
+          <p:cNvPr id="4" name="Espaço Reservado para Data 3">
+            <a:extLst>
+              <a:ext uri="{FF2B5EF4-FFF2-40B4-BE49-F238E27FC236}">
+                <a16:creationId xmlns:a16="http://schemas.microsoft.com/office/drawing/2014/main" id="{07B473E5-E489-E7C5-224B-D5007380083D}"/>
+              </a:ext>
+            </a:extLst>
+          </p:cNvPr>
+          <p:cNvSpPr>
+            <a:spLocks noGrp="1"/>
+          </p:cNvSpPr>
+          <p:nvPr>
+            <p:ph type="dt" sz="half" idx="10"/>
+          </p:nvPr>
+        </p:nvSpPr>
+        <p:spPr/>
+        <p:txBody>
+          <a:bodyPr/>
+          <a:lstStyle/>
+          <a:p>
+            <a:fld id="{BD8A6101-0C66-48F8-93A8-A36B06FAB579}" type="datetime1">
+              <a:rPr lang="en-US" smtClean="0"/>
+              <a:t>6/18/2024</a:t>
+            </a:fld>
+            <a:endParaRPr lang="en-US"/>
+          </a:p>
+        </p:txBody>
+      </p:sp>
+      <p:sp>
+        <p:nvSpPr>
+          <p:cNvPr id="5" name="Espaço Reservado para Rodapé 4">
+            <a:extLst>
+              <a:ext uri="{FF2B5EF4-FFF2-40B4-BE49-F238E27FC236}">
+                <a16:creationId xmlns:a16="http://schemas.microsoft.com/office/drawing/2014/main" id="{D9484BD9-C503-5AE9-0409-6C3506229377}"/>
+              </a:ext>
+            </a:extLst>
+          </p:cNvPr>
+          <p:cNvSpPr>
+            <a:spLocks noGrp="1"/>
+          </p:cNvSpPr>
+          <p:nvPr>
+            <p:ph type="ftr" sz="quarter" idx="11"/>
+          </p:nvPr>
+        </p:nvSpPr>
+        <p:spPr/>
+        <p:txBody>
+          <a:bodyPr/>
+          <a:lstStyle/>
+          <a:p>
+            <a:r>
+              <a:rPr lang="en-US"/>
+              <a:t>
+              </a:t>
+            </a:r>
+          </a:p>
+        </p:txBody>
+      </p:sp>
+      <p:sp>
+        <p:nvSpPr>
+          <p:cNvPr id="6" name="Espaço Reservado para Número de Slide 5">
+            <a:extLst>
+              <a:ext uri="{FF2B5EF4-FFF2-40B4-BE49-F238E27FC236}">
+                <a16:creationId xmlns:a16="http://schemas.microsoft.com/office/drawing/2014/main" id="{2F6417F0-86CE-3F27-11A1-0C8A286085F5}"/>
+              </a:ext>
+            </a:extLst>
+          </p:cNvPr>
+          <p:cNvSpPr>
+            <a:spLocks noGrp="1"/>
+          </p:cNvSpPr>
+          <p:nvPr>
+            <p:ph type="sldNum" sz="quarter" idx="12"/>
+          </p:nvPr>
+        </p:nvSpPr>
+        <p:spPr/>
+        <p:txBody>
+          <a:bodyPr/>
+          <a:lstStyle/>
+          <a:p>
+            <a:fld id="{E30AF5A0-43BB-4336-8627-9123B9144D80}" type="slidenum">
+              <a:rPr lang="en-US" smtClean="0"/>
+              <a:t>16</a:t>
+            </a:fld>
+            <a:endParaRPr lang="en-US"/>
+          </a:p>
+        </p:txBody>
+      </p:sp>
+    </p:spTree>
+    <p:extLst>
+      <p:ext uri="{BB962C8B-B14F-4D97-AF65-F5344CB8AC3E}">
+        <p14:creationId xmlns:p14="http://schemas.microsoft.com/office/powerpoint/2010/main" val="2287349985"/>
+      </p:ext>
+    </p:extLst>
+  </p:cSld>
+  <p:clrMapOvr>
+    <a:masterClrMapping/>
+  </p:clrMapOvr>
+</p:sld>
+</file>
+
+<file path=ppt/slides/slide17.xml><?xml version="1.0" encoding="utf-8"?>
+<p:sld xmlns:a="http://schemas.openxmlformats.org/drawingml/2006/main" xmlns:r="http://schemas.openxmlformats.org/officeDocument/2006/relationships" xmlns:p="http://schemas.openxmlformats.org/presentationml/2006/main">
+  <p:cSld>
+    <p:spTree>
+      <p:nvGrpSpPr>
+        <p:cNvPr id="1" name=""/>
+        <p:cNvGrpSpPr/>
+        <p:nvPr/>
+      </p:nvGrpSpPr>
+      <p:grpSpPr>
+        <a:xfrm>
+          <a:off x="0" y="0"/>
+          <a:ext cx="0" cy="0"/>
+          <a:chOff x="0" y="0"/>
+          <a:chExt cx="0" cy="0"/>
+        </a:xfrm>
+      </p:grpSpPr>
+      <p:sp>
+        <p:nvSpPr>
+          <p:cNvPr id="2" name="Título 1">
+            <a:extLst>
+              <a:ext uri="{FF2B5EF4-FFF2-40B4-BE49-F238E27FC236}">
+                <a16:creationId xmlns:a16="http://schemas.microsoft.com/office/drawing/2014/main" id="{4E319447-D02E-7C4B-241A-4A96C7ABC44D}"/>
+              </a:ext>
+            </a:extLst>
+          </p:cNvPr>
+          <p:cNvSpPr>
+            <a:spLocks noGrp="1"/>
+          </p:cNvSpPr>
+          <p:nvPr>
+            <p:ph type="title"/>
+          </p:nvPr>
+        </p:nvSpPr>
+        <p:spPr/>
+        <p:txBody>
+          <a:bodyPr/>
+          <a:lstStyle/>
+          <a:p>
+            <a:r>
+              <a:rPr lang="en-US" err="1"/>
+              <a:t>Referências</a:t>
+            </a:r>
+            <a:r>
+              <a:rPr lang="en-US"/>
+              <a:t> </a:t>
+            </a:r>
+            <a:r>
+              <a:rPr lang="en-US" err="1"/>
+              <a:t>bibliográficas</a:t>
+            </a:r>
+            <a:endParaRPr lang="pt-BR"/>
+          </a:p>
+        </p:txBody>
+      </p:sp>
+      <p:sp>
+        <p:nvSpPr>
+          <p:cNvPr id="3" name="Espaço Reservado para Conteúdo 2">
+            <a:extLst>
+              <a:ext uri="{FF2B5EF4-FFF2-40B4-BE49-F238E27FC236}">
+                <a16:creationId xmlns:a16="http://schemas.microsoft.com/office/drawing/2014/main" id="{DF5ABD57-ADCB-25E7-5CDB-095C18654DD9}"/>
+              </a:ext>
+            </a:extLst>
+          </p:cNvPr>
+          <p:cNvSpPr>
+            <a:spLocks noGrp="1"/>
+          </p:cNvSpPr>
+          <p:nvPr>
+            <p:ph idx="1"/>
+          </p:nvPr>
+        </p:nvSpPr>
+        <p:spPr/>
+        <p:txBody>
+          <a:bodyPr vert="horz" lIns="91440" tIns="45720" rIns="91440" bIns="45720" rtlCol="0" anchor="t">
+            <a:normAutofit fontScale="85000" lnSpcReduction="10000"/>
+          </a:bodyPr>
+          <a:lstStyle/>
+          <a:p>
+            <a:r>
+              <a:rPr lang="en-US" b="0" i="0" dirty="0">
+                <a:solidFill>
+                  <a:srgbClr val="37393C"/>
+                </a:solidFill>
+                <a:effectLst/>
+                <a:highlight>
+                  <a:srgbClr val="FFFFFF"/>
+                </a:highlight>
+              </a:rPr>
+              <a:t>COHEN, E. </a:t>
+            </a:r>
+            <a:r>
+              <a:rPr lang="en-US" b="1" i="0" dirty="0">
+                <a:solidFill>
+                  <a:srgbClr val="37393C"/>
+                </a:solidFill>
+                <a:effectLst/>
+                <a:highlight>
+                  <a:srgbClr val="FFFFFF"/>
+                </a:highlight>
+              </a:rPr>
+              <a:t>How to use Critical Path Method for complete beginners (with examples)</a:t>
+            </a:r>
+            <a:r>
+              <a:rPr lang="en-US" b="0" i="0" dirty="0">
+                <a:solidFill>
+                  <a:srgbClr val="37393C"/>
+                </a:solidFill>
+                <a:effectLst/>
+                <a:highlight>
+                  <a:srgbClr val="FFFFFF"/>
+                </a:highlight>
+              </a:rPr>
+              <a:t>. </a:t>
+            </a:r>
+            <a:r>
+              <a:rPr lang="en-US" b="0" i="0" dirty="0" err="1">
+                <a:solidFill>
+                  <a:srgbClr val="37393C"/>
+                </a:solidFill>
+                <a:effectLst/>
+                <a:highlight>
+                  <a:srgbClr val="FFFFFF"/>
+                </a:highlight>
+              </a:rPr>
+              <a:t>Disponível</a:t>
+            </a:r>
+            <a:r>
+              <a:rPr lang="en-US" b="0" i="0" dirty="0">
+                <a:solidFill>
+                  <a:srgbClr val="37393C"/>
+                </a:solidFill>
+                <a:effectLst/>
+                <a:highlight>
+                  <a:srgbClr val="FFFFFF"/>
+                </a:highlight>
+              </a:rPr>
+              <a:t> </a:t>
+            </a:r>
+            <a:r>
+              <a:rPr lang="en-US" b="0" i="0" dirty="0" err="1">
+                <a:solidFill>
+                  <a:srgbClr val="37393C"/>
+                </a:solidFill>
+                <a:effectLst/>
+                <a:highlight>
+                  <a:srgbClr val="FFFFFF"/>
+                </a:highlight>
+              </a:rPr>
+              <a:t>em</a:t>
+            </a:r>
+            <a:r>
+              <a:rPr lang="en-US" b="0" i="0" dirty="0">
+                <a:solidFill>
+                  <a:srgbClr val="37393C"/>
+                </a:solidFill>
+                <a:effectLst/>
+                <a:highlight>
+                  <a:srgbClr val="FFFFFF"/>
+                </a:highlight>
+              </a:rPr>
+              <a:t>: &lt;https://www.workamajig.com/blog/critical-path-method&gt;. </a:t>
+            </a:r>
+            <a:r>
+              <a:rPr lang="en-US" b="0" i="0" dirty="0" err="1">
+                <a:solidFill>
+                  <a:srgbClr val="37393C"/>
+                </a:solidFill>
+                <a:effectLst/>
+                <a:highlight>
+                  <a:srgbClr val="FFFFFF"/>
+                </a:highlight>
+              </a:rPr>
+              <a:t>Acesso</a:t>
+            </a:r>
+            <a:r>
+              <a:rPr lang="en-US" b="0" i="0" dirty="0">
+                <a:solidFill>
+                  <a:srgbClr val="37393C"/>
+                </a:solidFill>
+                <a:effectLst/>
+                <a:highlight>
+                  <a:srgbClr val="FFFFFF"/>
+                </a:highlight>
+              </a:rPr>
+              <a:t> </a:t>
+            </a:r>
+            <a:r>
+              <a:rPr lang="en-US" b="0" i="0" dirty="0" err="1">
+                <a:solidFill>
+                  <a:srgbClr val="37393C"/>
+                </a:solidFill>
+                <a:effectLst/>
+                <a:highlight>
+                  <a:srgbClr val="FFFFFF"/>
+                </a:highlight>
+              </a:rPr>
+              <a:t>em</a:t>
+            </a:r>
+            <a:r>
+              <a:rPr lang="en-US" b="0" i="0" dirty="0">
+                <a:solidFill>
+                  <a:srgbClr val="37393C"/>
+                </a:solidFill>
+                <a:effectLst/>
+                <a:highlight>
+                  <a:srgbClr val="FFFFFF"/>
+                </a:highlight>
+              </a:rPr>
+              <a:t>: 18 jun. 2024.</a:t>
+            </a:r>
+          </a:p>
+          <a:p>
+            <a:r>
+              <a:rPr lang="pt-BR" b="1" dirty="0" err="1">
+                <a:effectLst/>
+              </a:rPr>
+              <a:t>Critical</a:t>
+            </a:r>
+            <a:r>
+              <a:rPr lang="pt-BR" b="1" dirty="0">
+                <a:effectLst/>
+              </a:rPr>
+              <a:t> path </a:t>
+            </a:r>
+            <a:r>
+              <a:rPr lang="pt-BR" b="1" dirty="0" err="1">
+                <a:effectLst/>
+              </a:rPr>
+              <a:t>analysis</a:t>
+            </a:r>
+            <a:r>
+              <a:rPr lang="pt-BR" dirty="0">
+                <a:effectLst/>
+              </a:rPr>
+              <a:t>. Disponível em: &lt;https://www.studysmarter.co.uk/</a:t>
+            </a:r>
+            <a:r>
+              <a:rPr lang="pt-BR" dirty="0" err="1">
+                <a:effectLst/>
+              </a:rPr>
+              <a:t>explanations</a:t>
+            </a:r>
+            <a:r>
+              <a:rPr lang="pt-BR" dirty="0">
+                <a:effectLst/>
+              </a:rPr>
+              <a:t>/</a:t>
+            </a:r>
+            <a:r>
+              <a:rPr lang="pt-BR" dirty="0" err="1">
+                <a:effectLst/>
+              </a:rPr>
+              <a:t>math</a:t>
+            </a:r>
+            <a:r>
+              <a:rPr lang="pt-BR" dirty="0">
+                <a:effectLst/>
+              </a:rPr>
+              <a:t>/</a:t>
+            </a:r>
+            <a:r>
+              <a:rPr lang="pt-BR" dirty="0" err="1">
+                <a:effectLst/>
+              </a:rPr>
+              <a:t>decision-maths</a:t>
+            </a:r>
+            <a:r>
+              <a:rPr lang="pt-BR" dirty="0">
+                <a:effectLst/>
+              </a:rPr>
+              <a:t>/</a:t>
+            </a:r>
+            <a:r>
+              <a:rPr lang="pt-BR" dirty="0" err="1">
+                <a:effectLst/>
+              </a:rPr>
+              <a:t>critical</a:t>
+            </a:r>
+            <a:r>
+              <a:rPr lang="pt-BR" dirty="0">
+                <a:effectLst/>
+              </a:rPr>
+              <a:t>-path-</a:t>
+            </a:r>
+            <a:r>
+              <a:rPr lang="pt-BR" dirty="0" err="1">
+                <a:effectLst/>
+              </a:rPr>
+              <a:t>analysis</a:t>
+            </a:r>
+            <a:r>
+              <a:rPr lang="pt-BR" dirty="0">
+                <a:effectLst/>
+              </a:rPr>
+              <a:t>/&gt;. Acesso em: 18 jun. 2024.</a:t>
+            </a:r>
+          </a:p>
+          <a:p>
+            <a:r>
+              <a:rPr lang="pt-BR" dirty="0">
+                <a:effectLst/>
+              </a:rPr>
+              <a:t>EBY, K. </a:t>
+            </a:r>
+            <a:r>
+              <a:rPr lang="pt-BR" b="1" dirty="0">
+                <a:effectLst/>
+              </a:rPr>
+              <a:t>The </a:t>
+            </a:r>
+            <a:r>
+              <a:rPr lang="pt-BR" b="1" dirty="0" err="1">
+                <a:effectLst/>
+              </a:rPr>
+              <a:t>ultimate</a:t>
+            </a:r>
+            <a:r>
+              <a:rPr lang="pt-BR" b="1" dirty="0">
+                <a:effectLst/>
+              </a:rPr>
+              <a:t> </a:t>
+            </a:r>
+            <a:r>
+              <a:rPr lang="pt-BR" b="1" dirty="0" err="1">
+                <a:effectLst/>
+              </a:rPr>
+              <a:t>guide</a:t>
+            </a:r>
+            <a:r>
+              <a:rPr lang="pt-BR" b="1" dirty="0">
+                <a:effectLst/>
+              </a:rPr>
+              <a:t> </a:t>
+            </a:r>
+            <a:r>
+              <a:rPr lang="pt-BR" b="1" dirty="0" err="1">
+                <a:effectLst/>
+              </a:rPr>
+              <a:t>to</a:t>
+            </a:r>
+            <a:r>
+              <a:rPr lang="pt-BR" b="1" dirty="0">
+                <a:effectLst/>
+              </a:rPr>
+              <a:t> </a:t>
+            </a:r>
+            <a:r>
+              <a:rPr lang="pt-BR" b="1" dirty="0" err="1">
+                <a:effectLst/>
+              </a:rPr>
+              <a:t>the</a:t>
+            </a:r>
+            <a:r>
+              <a:rPr lang="pt-BR" b="1" dirty="0">
+                <a:effectLst/>
+              </a:rPr>
+              <a:t> </a:t>
+            </a:r>
+            <a:r>
+              <a:rPr lang="pt-BR" b="1" dirty="0" err="1">
+                <a:effectLst/>
+              </a:rPr>
+              <a:t>critical</a:t>
+            </a:r>
+            <a:r>
+              <a:rPr lang="pt-BR" b="1" dirty="0">
+                <a:effectLst/>
+              </a:rPr>
+              <a:t> path </a:t>
+            </a:r>
+            <a:r>
+              <a:rPr lang="pt-BR" b="1" dirty="0" err="1">
+                <a:effectLst/>
+              </a:rPr>
+              <a:t>method</a:t>
+            </a:r>
+            <a:r>
+              <a:rPr lang="pt-BR" dirty="0">
+                <a:effectLst/>
+              </a:rPr>
+              <a:t>. </a:t>
+            </a:r>
+            <a:r>
+              <a:rPr lang="pt-BR" b="1" dirty="0" err="1">
+                <a:effectLst/>
+              </a:rPr>
+              <a:t>Smartsheet</a:t>
+            </a:r>
+            <a:r>
+              <a:rPr lang="pt-BR" dirty="0">
+                <a:effectLst/>
+              </a:rPr>
+              <a:t>, 30 abr. 2015. Disponível em: &lt;https://www.smartsheet.com/</a:t>
+            </a:r>
+            <a:r>
+              <a:rPr lang="pt-BR" dirty="0" err="1">
+                <a:effectLst/>
+              </a:rPr>
+              <a:t>critical</a:t>
+            </a:r>
+            <a:r>
+              <a:rPr lang="pt-BR" dirty="0">
+                <a:effectLst/>
+              </a:rPr>
+              <a:t>-path-</a:t>
+            </a:r>
+            <a:r>
+              <a:rPr lang="pt-BR" dirty="0" err="1">
+                <a:effectLst/>
+              </a:rPr>
+              <a:t>method</a:t>
+            </a:r>
+            <a:r>
+              <a:rPr lang="pt-BR" dirty="0">
+                <a:effectLst/>
+              </a:rPr>
+              <a:t>&gt;. Acesso em: 18 jun. 2024</a:t>
+            </a:r>
+          </a:p>
+          <a:p>
+            <a:r>
+              <a:rPr lang="pt-BR" dirty="0">
+                <a:effectLst/>
+              </a:rPr>
+              <a:t>WIKIPEDIA CONTRIBUTORS. </a:t>
+            </a:r>
+            <a:r>
+              <a:rPr lang="pt-BR" b="1" dirty="0" err="1">
+                <a:effectLst/>
+              </a:rPr>
+              <a:t>Critical</a:t>
+            </a:r>
+            <a:r>
+              <a:rPr lang="pt-BR" b="1" dirty="0">
+                <a:effectLst/>
+              </a:rPr>
+              <a:t> path </a:t>
+            </a:r>
+            <a:r>
+              <a:rPr lang="pt-BR" b="1" dirty="0" err="1">
+                <a:effectLst/>
+              </a:rPr>
+              <a:t>method</a:t>
+            </a:r>
+            <a:r>
+              <a:rPr lang="pt-BR" dirty="0">
+                <a:effectLst/>
+              </a:rPr>
+              <a:t>. Disponível em: &lt;https://en.wikipedia.org/w/</a:t>
+            </a:r>
+            <a:r>
+              <a:rPr lang="pt-BR" dirty="0" err="1">
+                <a:effectLst/>
+              </a:rPr>
+              <a:t>index.php?title</a:t>
+            </a:r>
+            <a:r>
+              <a:rPr lang="pt-BR" dirty="0">
+                <a:effectLst/>
+              </a:rPr>
+              <a:t>=</a:t>
+            </a:r>
+            <a:r>
+              <a:rPr lang="pt-BR" dirty="0" err="1">
+                <a:effectLst/>
+              </a:rPr>
+              <a:t>Critical_path_method&amp;oldid</a:t>
+            </a:r>
+            <a:r>
+              <a:rPr lang="pt-BR" dirty="0">
+                <a:effectLst/>
+              </a:rPr>
+              <a:t>=1222967231&gt;.</a:t>
+            </a:r>
+          </a:p>
+          <a:p>
+            <a:r>
+              <a:rPr lang="pt-BR" dirty="0">
+                <a:effectLst/>
+              </a:rPr>
+              <a:t>Disponível em: &lt;https://www.pmi.org/learning/</a:t>
+            </a:r>
+            <a:r>
+              <a:rPr lang="pt-BR" dirty="0" err="1">
+                <a:effectLst/>
+              </a:rPr>
+              <a:t>library</a:t>
+            </a:r>
+            <a:r>
+              <a:rPr lang="pt-BR" dirty="0">
+                <a:effectLst/>
+              </a:rPr>
+              <a:t>/schedule-risk-analysis-simplified-10573&gt;. Acesso em: 18 jun. 2024.</a:t>
+            </a:r>
+          </a:p>
+        </p:txBody>
+      </p:sp>
+      <p:sp>
+        <p:nvSpPr>
+          <p:cNvPr id="4" name="Espaço Reservado para Data 3">
+            <a:extLst>
+              <a:ext uri="{FF2B5EF4-FFF2-40B4-BE49-F238E27FC236}">
+                <a16:creationId xmlns:a16="http://schemas.microsoft.com/office/drawing/2014/main" id="{E575A558-438B-6388-C74A-CB3D2C97D3F8}"/>
+              </a:ext>
+            </a:extLst>
+          </p:cNvPr>
+          <p:cNvSpPr>
+            <a:spLocks noGrp="1"/>
+          </p:cNvSpPr>
+          <p:nvPr>
+            <p:ph type="dt" sz="half" idx="10"/>
+          </p:nvPr>
+        </p:nvSpPr>
+        <p:spPr/>
+        <p:txBody>
+          <a:bodyPr/>
+          <a:lstStyle/>
+          <a:p>
+            <a:fld id="{5C0E8BC3-A60E-4E31-8AE4-2BE08893AD21}" type="datetime1">
+              <a:rPr lang="en-US" smtClean="0"/>
+              <a:t>6/18/2024</a:t>
+            </a:fld>
+            <a:endParaRPr lang="en-US"/>
+          </a:p>
+        </p:txBody>
+      </p:sp>
+      <p:sp>
+        <p:nvSpPr>
+          <p:cNvPr id="5" name="Espaço Reservado para Rodapé 4">
+            <a:extLst>
+              <a:ext uri="{FF2B5EF4-FFF2-40B4-BE49-F238E27FC236}">
+                <a16:creationId xmlns:a16="http://schemas.microsoft.com/office/drawing/2014/main" id="{5792529F-47F6-73F8-4E0C-FA5B71473D22}"/>
+              </a:ext>
+            </a:extLst>
+          </p:cNvPr>
+          <p:cNvSpPr>
+            <a:spLocks noGrp="1"/>
+          </p:cNvSpPr>
+          <p:nvPr>
+            <p:ph type="ftr" sz="quarter" idx="11"/>
+          </p:nvPr>
+        </p:nvSpPr>
+        <p:spPr/>
+        <p:txBody>
+          <a:bodyPr/>
+          <a:lstStyle/>
+          <a:p>
+            <a:r>
+              <a:rPr lang="en-US" dirty="0"/>
+              <a:t>
+              </a:t>
+            </a:r>
+          </a:p>
+        </p:txBody>
+      </p:sp>
+      <p:sp>
+        <p:nvSpPr>
+          <p:cNvPr id="6" name="Espaço Reservado para Número de Slide 5">
+            <a:extLst>
+              <a:ext uri="{FF2B5EF4-FFF2-40B4-BE49-F238E27FC236}">
+                <a16:creationId xmlns:a16="http://schemas.microsoft.com/office/drawing/2014/main" id="{6590052F-4EE3-8698-0A10-CB8C4E35A1E4}"/>
+              </a:ext>
+            </a:extLst>
+          </p:cNvPr>
+          <p:cNvSpPr>
+            <a:spLocks noGrp="1"/>
+          </p:cNvSpPr>
+          <p:nvPr>
+            <p:ph type="sldNum" sz="quarter" idx="12"/>
+          </p:nvPr>
+        </p:nvSpPr>
+        <p:spPr/>
+        <p:txBody>
+          <a:bodyPr/>
+          <a:lstStyle/>
+          <a:p>
+            <a:fld id="{E30AF5A0-43BB-4336-8627-9123B9144D80}" type="slidenum">
+              <a:rPr lang="en-US" smtClean="0"/>
+              <a:t>17</a:t>
+            </a:fld>
+            <a:endParaRPr lang="en-US"/>
+          </a:p>
+        </p:txBody>
+      </p:sp>
+    </p:spTree>
+    <p:extLst>
+      <p:ext uri="{BB962C8B-B14F-4D97-AF65-F5344CB8AC3E}">
+        <p14:creationId xmlns:p14="http://schemas.microsoft.com/office/powerpoint/2010/main" val="2097304172"/>
+      </p:ext>
+    </p:extLst>
+  </p:cSld>
+  <p:clrMapOvr>
+    <a:masterClrMapping/>
+  </p:clrMapOvr>
+</p:sld>
+</file>
+
+<file path=ppt/slides/slide18.xml><?xml version="1.0" encoding="utf-8"?>
+<p:sld xmlns:a="http://schemas.openxmlformats.org/drawingml/2006/main" xmlns:r="http://schemas.openxmlformats.org/officeDocument/2006/relationships" xmlns:p="http://schemas.openxmlformats.org/presentationml/2006/main">
+  <p:cSld>
+    <p:spTree>
+      <p:nvGrpSpPr>
+        <p:cNvPr id="1" name=""/>
+        <p:cNvGrpSpPr/>
+        <p:nvPr/>
+      </p:nvGrpSpPr>
+      <p:grpSpPr>
+        <a:xfrm>
+          <a:off x="0" y="0"/>
+          <a:ext cx="0" cy="0"/>
+          <a:chOff x="0" y="0"/>
+          <a:chExt cx="0" cy="0"/>
+        </a:xfrm>
+      </p:grpSpPr>
+      <p:sp>
+        <p:nvSpPr>
+          <p:cNvPr id="2" name="Título 1">
+            <a:extLst>
+              <a:ext uri="{FF2B5EF4-FFF2-40B4-BE49-F238E27FC236}">
+                <a16:creationId xmlns:a16="http://schemas.microsoft.com/office/drawing/2014/main" id="{B1F35A36-4B8A-CC21-A7B3-D24FC5357485}"/>
+              </a:ext>
+            </a:extLst>
+          </p:cNvPr>
+          <p:cNvSpPr>
+            <a:spLocks noGrp="1"/>
+          </p:cNvSpPr>
+          <p:nvPr>
+            <p:ph type="title"/>
+          </p:nvPr>
+        </p:nvSpPr>
+        <p:spPr>
+          <a:xfrm>
+            <a:off x="1371828" y="2217082"/>
+            <a:ext cx="9448343" cy="1820173"/>
+          </a:xfrm>
+        </p:spPr>
+        <p:txBody>
+          <a:bodyPr/>
+          <a:lstStyle/>
+          <a:p>
+            <a:pPr algn="ctr"/>
+            <a:r>
+              <a:rPr lang="en-US" sz="5400" err="1"/>
+              <a:t>Obrigado</a:t>
+            </a:r>
+            <a:endParaRPr lang="pt-BR" sz="5400"/>
+          </a:p>
+        </p:txBody>
+      </p:sp>
+      <p:sp>
+        <p:nvSpPr>
+          <p:cNvPr id="4" name="Espaço Reservado para Data 3">
+            <a:extLst>
+              <a:ext uri="{FF2B5EF4-FFF2-40B4-BE49-F238E27FC236}">
+                <a16:creationId xmlns:a16="http://schemas.microsoft.com/office/drawing/2014/main" id="{50137EE9-4887-8E0A-6349-CC3BFA083A91}"/>
+              </a:ext>
+            </a:extLst>
+          </p:cNvPr>
+          <p:cNvSpPr>
+            <a:spLocks noGrp="1"/>
+          </p:cNvSpPr>
+          <p:nvPr>
+            <p:ph type="dt" sz="half" idx="10"/>
+          </p:nvPr>
+        </p:nvSpPr>
+        <p:spPr/>
+        <p:txBody>
+          <a:bodyPr/>
+          <a:lstStyle/>
+          <a:p>
+            <a:fld id="{8ADC9E49-246E-484A-926C-3041536DB8F7}" type="datetime1">
+              <a:rPr lang="en-US" smtClean="0"/>
+              <a:t>6/18/2024</a:t>
+            </a:fld>
+            <a:endParaRPr lang="en-US"/>
+          </a:p>
+        </p:txBody>
+      </p:sp>
+      <p:sp>
+        <p:nvSpPr>
+          <p:cNvPr id="5" name="Espaço Reservado para Rodapé 4">
+            <a:extLst>
+              <a:ext uri="{FF2B5EF4-FFF2-40B4-BE49-F238E27FC236}">
+                <a16:creationId xmlns:a16="http://schemas.microsoft.com/office/drawing/2014/main" id="{F359168D-AE6A-4BA1-7FED-DC37B5B538AC}"/>
+              </a:ext>
+            </a:extLst>
+          </p:cNvPr>
+          <p:cNvSpPr>
+            <a:spLocks noGrp="1"/>
+          </p:cNvSpPr>
+          <p:nvPr>
+            <p:ph type="ftr" sz="quarter" idx="11"/>
+          </p:nvPr>
+        </p:nvSpPr>
+        <p:spPr/>
+        <p:txBody>
+          <a:bodyPr/>
+          <a:lstStyle/>
+          <a:p>
+            <a:r>
+              <a:rPr lang="en-US"/>
+              <a:t>
+              </a:t>
+            </a:r>
+          </a:p>
+        </p:txBody>
+      </p:sp>
+      <p:sp>
+        <p:nvSpPr>
+          <p:cNvPr id="6" name="Espaço Reservado para Número de Slide 5">
+            <a:extLst>
+              <a:ext uri="{FF2B5EF4-FFF2-40B4-BE49-F238E27FC236}">
+                <a16:creationId xmlns:a16="http://schemas.microsoft.com/office/drawing/2014/main" id="{4880F13E-F76E-22C7-A8C6-39DB72471046}"/>
+              </a:ext>
+            </a:extLst>
+          </p:cNvPr>
+          <p:cNvSpPr>
+            <a:spLocks noGrp="1"/>
+          </p:cNvSpPr>
+          <p:nvPr>
+            <p:ph type="sldNum" sz="quarter" idx="12"/>
+          </p:nvPr>
+        </p:nvSpPr>
+        <p:spPr/>
+        <p:txBody>
+          <a:bodyPr/>
+          <a:lstStyle/>
+          <a:p>
+            <a:fld id="{196A61CA-0502-4EE4-9724-96EA822543E5}" type="slidenum">
+              <a:rPr lang="en-US" smtClean="0"/>
+              <a:t>18</a:t>
+            </a:fld>
+            <a:endParaRPr lang="en-US"/>
+          </a:p>
+        </p:txBody>
+      </p:sp>
+    </p:spTree>
+    <p:extLst>
+      <p:ext uri="{BB962C8B-B14F-4D97-AF65-F5344CB8AC3E}">
+        <p14:creationId xmlns:p14="http://schemas.microsoft.com/office/powerpoint/2010/main" val="2210678312"/>
+      </p:ext>
+    </p:extLst>
+  </p:cSld>
+  <p:clrMapOvr>
+    <a:masterClrMapping/>
+  </p:clrMapOvr>
+</p:sld>
+</file>
+
 <file path=ppt/slides/slide2.xml><?xml version="1.0" encoding="utf-8"?>
 <p:sld xmlns:a="http://schemas.openxmlformats.org/drawingml/2006/main" xmlns:r="http://schemas.openxmlformats.org/officeDocument/2006/relationships" xmlns:p="http://schemas.openxmlformats.org/presentationml/2006/main">
   <p:cSld>
@@ -8766,32 +11191,10 @@
           <a:bodyPr/>
           <a:lstStyle/>
           <a:p>
-            <a:endParaRPr lang="pt-BR"/>
-          </a:p>
-        </p:txBody>
-      </p:sp>
-      <p:sp>
-        <p:nvSpPr>
-          <p:cNvPr id="3" name="Espaço Reservado para Conteúdo 2">
-            <a:extLst>
-              <a:ext uri="{FF2B5EF4-FFF2-40B4-BE49-F238E27FC236}">
-                <a16:creationId xmlns:a16="http://schemas.microsoft.com/office/drawing/2014/main" id="{952ACA38-F60B-B84E-65EC-5BEC1FDD2299}"/>
-              </a:ext>
-            </a:extLst>
-          </p:cNvPr>
-          <p:cNvSpPr>
-            <a:spLocks noGrp="1"/>
-          </p:cNvSpPr>
-          <p:nvPr>
-            <p:ph idx="1"/>
-          </p:nvPr>
-        </p:nvSpPr>
-        <p:spPr/>
-        <p:txBody>
-          <a:bodyPr/>
-          <a:lstStyle/>
-          <a:p>
-            <a:endParaRPr lang="pt-BR"/>
+            <a:r>
+              <a:rPr lang="pt-BR" dirty="0"/>
+              <a:t>Grafo</a:t>
+            </a:r>
           </a:p>
         </p:txBody>
       </p:sp>
@@ -8882,6 +11285,35 @@
           </a:p>
         </p:txBody>
       </p:sp>
+      <p:pic>
+        <p:nvPicPr>
+          <p:cNvPr id="12" name="Espaço Reservado para Conteúdo 11">
+            <a:extLst>
+              <a:ext uri="{FF2B5EF4-FFF2-40B4-BE49-F238E27FC236}">
+                <a16:creationId xmlns:a16="http://schemas.microsoft.com/office/drawing/2014/main" id="{B554D133-E162-8312-CF47-01FA75301D3D}"/>
+              </a:ext>
+            </a:extLst>
+          </p:cNvPr>
+          <p:cNvPicPr>
+            <a:picLocks noGrp="1" noChangeAspect="1"/>
+          </p:cNvPicPr>
+          <p:nvPr>
+            <p:ph idx="1"/>
+          </p:nvPr>
+        </p:nvPicPr>
+        <p:blipFill>
+          <a:blip r:embed="rId2"/>
+          <a:stretch>
+            <a:fillRect/>
+          </a:stretch>
+        </p:blipFill>
+        <p:spPr>
+          <a:xfrm>
+            <a:off x="1752590" y="2292350"/>
+            <a:ext cx="8586808" cy="3636963"/>
+          </a:xfrm>
+        </p:spPr>
+      </p:pic>
     </p:spTree>
     <p:extLst>
       <p:ext uri="{BB962C8B-B14F-4D97-AF65-F5344CB8AC3E}">
@@ -8917,7 +11349,7 @@
           <p:cNvPr id="2" name="Título 1">
             <a:extLst>
               <a:ext uri="{FF2B5EF4-FFF2-40B4-BE49-F238E27FC236}">
-                <a16:creationId xmlns:a16="http://schemas.microsoft.com/office/drawing/2014/main" id="{72540168-690A-37A3-E7DF-CE9E07425A35}"/>
+                <a16:creationId xmlns:a16="http://schemas.microsoft.com/office/drawing/2014/main" id="{D6EF0203-0FD0-7631-55B9-F7DBF87560D8}"/>
               </a:ext>
             </a:extLst>
           </p:cNvPr>
@@ -8933,57 +11365,64 @@
           <a:bodyPr/>
           <a:lstStyle/>
           <a:p>
-            <a:endParaRPr lang="pt-BR"/>
-          </a:p>
-        </p:txBody>
-      </p:sp>
-      <p:sp>
-        <p:nvSpPr>
-          <p:cNvPr id="3" name="Espaço Reservado para Conteúdo 2">
-            <a:extLst>
-              <a:ext uri="{FF2B5EF4-FFF2-40B4-BE49-F238E27FC236}">
-                <a16:creationId xmlns:a16="http://schemas.microsoft.com/office/drawing/2014/main" id="{6C080BB9-26FF-5CC0-708F-C8E7C71EAD35}"/>
-              </a:ext>
-            </a:extLst>
-          </p:cNvPr>
-          <p:cNvSpPr>
-            <a:spLocks noGrp="1"/>
-          </p:cNvSpPr>
+            <a:r>
+              <a:rPr lang="pt-BR" dirty="0"/>
+              <a:t>Grafo</a:t>
+            </a:r>
+          </a:p>
+        </p:txBody>
+      </p:sp>
+      <p:pic>
+        <p:nvPicPr>
+          <p:cNvPr id="8" name="Espaço Reservado para Conteúdo 7">
+            <a:extLst>
+              <a:ext uri="{FF2B5EF4-FFF2-40B4-BE49-F238E27FC236}">
+                <a16:creationId xmlns:a16="http://schemas.microsoft.com/office/drawing/2014/main" id="{DABDF2D5-EB21-74D7-5DB5-EAC903EE467C}"/>
+              </a:ext>
+            </a:extLst>
+          </p:cNvPr>
+          <p:cNvPicPr>
+            <a:picLocks noGrp="1" noChangeAspect="1"/>
+          </p:cNvPicPr>
           <p:nvPr>
             <p:ph idx="1"/>
           </p:nvPr>
+        </p:nvPicPr>
+        <p:blipFill>
+          <a:blip r:embed="rId2"/>
+          <a:stretch>
+            <a:fillRect/>
+          </a:stretch>
+        </p:blipFill>
+        <p:spPr>
+          <a:xfrm>
+            <a:off x="1457434" y="2292350"/>
+            <a:ext cx="9177119" cy="3636963"/>
+          </a:xfrm>
+        </p:spPr>
+      </p:pic>
+      <p:sp>
+        <p:nvSpPr>
+          <p:cNvPr id="4" name="Espaço Reservado para Data 3">
+            <a:extLst>
+              <a:ext uri="{FF2B5EF4-FFF2-40B4-BE49-F238E27FC236}">
+                <a16:creationId xmlns:a16="http://schemas.microsoft.com/office/drawing/2014/main" id="{6F8ADF45-D050-9649-9015-4C7D33249D67}"/>
+              </a:ext>
+            </a:extLst>
+          </p:cNvPr>
+          <p:cNvSpPr>
+            <a:spLocks noGrp="1"/>
+          </p:cNvSpPr>
+          <p:nvPr>
+            <p:ph type="dt" sz="half" idx="10"/>
+          </p:nvPr>
         </p:nvSpPr>
         <p:spPr/>
         <p:txBody>
           <a:bodyPr/>
           <a:lstStyle/>
           <a:p>
-            <a:endParaRPr lang="pt-BR"/>
-          </a:p>
-        </p:txBody>
-      </p:sp>
-      <p:sp>
-        <p:nvSpPr>
-          <p:cNvPr id="4" name="Espaço Reservado para Data 3">
-            <a:extLst>
-              <a:ext uri="{FF2B5EF4-FFF2-40B4-BE49-F238E27FC236}">
-                <a16:creationId xmlns:a16="http://schemas.microsoft.com/office/drawing/2014/main" id="{09BF8850-3B0D-264C-1F68-170B6332FBEA}"/>
-              </a:ext>
-            </a:extLst>
-          </p:cNvPr>
-          <p:cNvSpPr>
-            <a:spLocks noGrp="1"/>
-          </p:cNvSpPr>
-          <p:nvPr>
-            <p:ph type="dt" sz="half" idx="10"/>
-          </p:nvPr>
-        </p:nvSpPr>
-        <p:spPr/>
-        <p:txBody>
-          <a:bodyPr/>
-          <a:lstStyle/>
-          <a:p>
-            <a:fld id="{804C12D4-F0C4-44A2-9DFB-3E890510E53E}" type="datetime1">
+            <a:fld id="{37F9D5A5-9912-4440-AE4C-B73AD405BD32}" type="datetime1">
               <a:rPr lang="en-US" smtClean="0"/>
               <a:t>6/18/2024</a:t>
             </a:fld>
@@ -8996,7 +11435,7 @@
           <p:cNvPr id="5" name="Espaço Reservado para Rodapé 4">
             <a:extLst>
               <a:ext uri="{FF2B5EF4-FFF2-40B4-BE49-F238E27FC236}">
-                <a16:creationId xmlns:a16="http://schemas.microsoft.com/office/drawing/2014/main" id="{37ED183A-4C07-A9D8-B202-69DD13FC653B}"/>
+                <a16:creationId xmlns:a16="http://schemas.microsoft.com/office/drawing/2014/main" id="{18D5994B-9D6F-247A-E081-501F71DCDC7B}"/>
               </a:ext>
             </a:extLst>
           </p:cNvPr>
@@ -9025,7 +11464,7 @@
           <p:cNvPr id="6" name="Espaço Reservado para Número de Slide 5">
             <a:extLst>
               <a:ext uri="{FF2B5EF4-FFF2-40B4-BE49-F238E27FC236}">
-                <a16:creationId xmlns:a16="http://schemas.microsoft.com/office/drawing/2014/main" id="{251D35ED-FB46-CBF5-372F-844D6D00F563}"/>
+                <a16:creationId xmlns:a16="http://schemas.microsoft.com/office/drawing/2014/main" id="{E5FD0A63-FB0B-F8DD-0323-4BA26325DBE4}"/>
               </a:ext>
             </a:extLst>
           </p:cNvPr>
@@ -9052,7 +11491,7 @@
     </p:spTree>
     <p:extLst>
       <p:ext uri="{BB962C8B-B14F-4D97-AF65-F5344CB8AC3E}">
-        <p14:creationId xmlns:p14="http://schemas.microsoft.com/office/powerpoint/2010/main" val="3523369083"/>
+        <p14:creationId xmlns:p14="http://schemas.microsoft.com/office/powerpoint/2010/main" val="1217120992"/>
       </p:ext>
     </p:extLst>
   </p:cSld>
@@ -9084,7 +11523,7 @@
           <p:cNvPr id="2" name="Título 1">
             <a:extLst>
               <a:ext uri="{FF2B5EF4-FFF2-40B4-BE49-F238E27FC236}">
-                <a16:creationId xmlns:a16="http://schemas.microsoft.com/office/drawing/2014/main" id="{4E319447-D02E-7C4B-241A-4A96C7ABC44D}"/>
+                <a16:creationId xmlns:a16="http://schemas.microsoft.com/office/drawing/2014/main" id="{9FD510CF-AB6C-8BCB-FFB1-434DCA12FCFC}"/>
               </a:ext>
             </a:extLst>
           </p:cNvPr>
@@ -9101,485 +11540,63 @@
           <a:lstStyle/>
           <a:p>
             <a:r>
-              <a:rPr lang="en-US" err="1"/>
-              <a:t>Referências</a:t>
-            </a:r>
-            <a:r>
-              <a:rPr lang="en-US"/>
-              <a:t> </a:t>
-            </a:r>
-            <a:r>
-              <a:rPr lang="en-US" err="1"/>
-              <a:t>bibliográficas</a:t>
-            </a:r>
-            <a:endParaRPr lang="pt-BR"/>
-          </a:p>
-        </p:txBody>
-      </p:sp>
-      <p:sp>
-        <p:nvSpPr>
-          <p:cNvPr id="3" name="Espaço Reservado para Conteúdo 2">
-            <a:extLst>
-              <a:ext uri="{FF2B5EF4-FFF2-40B4-BE49-F238E27FC236}">
-                <a16:creationId xmlns:a16="http://schemas.microsoft.com/office/drawing/2014/main" id="{DF5ABD57-ADCB-25E7-5CDB-095C18654DD9}"/>
-              </a:ext>
-            </a:extLst>
-          </p:cNvPr>
-          <p:cNvSpPr>
-            <a:spLocks noGrp="1"/>
-          </p:cNvSpPr>
+              <a:rPr lang="pt-BR" dirty="0"/>
+              <a:t>Grafo</a:t>
+            </a:r>
+          </a:p>
+        </p:txBody>
+      </p:sp>
+      <p:pic>
+        <p:nvPicPr>
+          <p:cNvPr id="8" name="Espaço Reservado para Conteúdo 7">
+            <a:extLst>
+              <a:ext uri="{FF2B5EF4-FFF2-40B4-BE49-F238E27FC236}">
+                <a16:creationId xmlns:a16="http://schemas.microsoft.com/office/drawing/2014/main" id="{7AA32744-C6BF-74B2-EC95-E84101C81EC9}"/>
+              </a:ext>
+            </a:extLst>
+          </p:cNvPr>
+          <p:cNvPicPr>
+            <a:picLocks noGrp="1" noChangeAspect="1"/>
+          </p:cNvPicPr>
           <p:nvPr>
             <p:ph idx="1"/>
           </p:nvPr>
+        </p:nvPicPr>
+        <p:blipFill>
+          <a:blip r:embed="rId2"/>
+          <a:stretch>
+            <a:fillRect/>
+          </a:stretch>
+        </p:blipFill>
+        <p:spPr>
+          <a:xfrm>
+            <a:off x="1628457" y="2292350"/>
+            <a:ext cx="8835074" cy="3636963"/>
+          </a:xfrm>
+        </p:spPr>
+      </p:pic>
+      <p:sp>
+        <p:nvSpPr>
+          <p:cNvPr id="4" name="Espaço Reservado para Data 3">
+            <a:extLst>
+              <a:ext uri="{FF2B5EF4-FFF2-40B4-BE49-F238E27FC236}">
+                <a16:creationId xmlns:a16="http://schemas.microsoft.com/office/drawing/2014/main" id="{1374D3D1-EEAD-6860-0005-1912CEFD5098}"/>
+              </a:ext>
+            </a:extLst>
+          </p:cNvPr>
+          <p:cNvSpPr>
+            <a:spLocks noGrp="1"/>
+          </p:cNvSpPr>
+          <p:nvPr>
+            <p:ph type="dt" sz="half" idx="10"/>
+          </p:nvPr>
         </p:nvSpPr>
         <p:spPr/>
         <p:txBody>
-          <a:bodyPr vert="horz" lIns="91440" tIns="45720" rIns="91440" bIns="45720" rtlCol="0" anchor="t">
-            <a:normAutofit fontScale="85000" lnSpcReduction="10000"/>
-          </a:bodyPr>
-          <a:lstStyle/>
-          <a:p>
-            <a:r>
-              <a:rPr lang="en-US" b="0" i="0" dirty="0">
-                <a:solidFill>
-                  <a:srgbClr val="37393C"/>
-                </a:solidFill>
-                <a:effectLst/>
-                <a:highlight>
-                  <a:srgbClr val="FFFFFF"/>
-                </a:highlight>
-              </a:rPr>
-              <a:t>COHEN, E. </a:t>
-            </a:r>
-            <a:r>
-              <a:rPr lang="en-US" b="1" i="0" dirty="0">
-                <a:solidFill>
-                  <a:srgbClr val="37393C"/>
-                </a:solidFill>
-                <a:effectLst/>
-                <a:highlight>
-                  <a:srgbClr val="FFFFFF"/>
-                </a:highlight>
-              </a:rPr>
-              <a:t>How to use Critical Path Method for complete beginners (with examples)</a:t>
-            </a:r>
-            <a:r>
-              <a:rPr lang="en-US" b="0" i="0" dirty="0">
-                <a:solidFill>
-                  <a:srgbClr val="37393C"/>
-                </a:solidFill>
-                <a:effectLst/>
-                <a:highlight>
-                  <a:srgbClr val="FFFFFF"/>
-                </a:highlight>
-              </a:rPr>
-              <a:t>. </a:t>
-            </a:r>
-            <a:r>
-              <a:rPr lang="en-US" b="0" i="0" dirty="0" err="1">
-                <a:solidFill>
-                  <a:srgbClr val="37393C"/>
-                </a:solidFill>
-                <a:effectLst/>
-                <a:highlight>
-                  <a:srgbClr val="FFFFFF"/>
-                </a:highlight>
-              </a:rPr>
-              <a:t>Disponível</a:t>
-            </a:r>
-            <a:r>
-              <a:rPr lang="en-US" b="0" i="0" dirty="0">
-                <a:solidFill>
-                  <a:srgbClr val="37393C"/>
-                </a:solidFill>
-                <a:effectLst/>
-                <a:highlight>
-                  <a:srgbClr val="FFFFFF"/>
-                </a:highlight>
-              </a:rPr>
-              <a:t> </a:t>
-            </a:r>
-            <a:r>
-              <a:rPr lang="en-US" b="0" i="0" dirty="0" err="1">
-                <a:solidFill>
-                  <a:srgbClr val="37393C"/>
-                </a:solidFill>
-                <a:effectLst/>
-                <a:highlight>
-                  <a:srgbClr val="FFFFFF"/>
-                </a:highlight>
-              </a:rPr>
-              <a:t>em</a:t>
-            </a:r>
-            <a:r>
-              <a:rPr lang="en-US" b="0" i="0" dirty="0">
-                <a:solidFill>
-                  <a:srgbClr val="37393C"/>
-                </a:solidFill>
-                <a:effectLst/>
-                <a:highlight>
-                  <a:srgbClr val="FFFFFF"/>
-                </a:highlight>
-              </a:rPr>
-              <a:t>: &lt;https://www.workamajig.com/blog/critical-path-method&gt;. </a:t>
-            </a:r>
-            <a:r>
-              <a:rPr lang="en-US" b="0" i="0" dirty="0" err="1">
-                <a:solidFill>
-                  <a:srgbClr val="37393C"/>
-                </a:solidFill>
-                <a:effectLst/>
-                <a:highlight>
-                  <a:srgbClr val="FFFFFF"/>
-                </a:highlight>
-              </a:rPr>
-              <a:t>Acesso</a:t>
-            </a:r>
-            <a:r>
-              <a:rPr lang="en-US" b="0" i="0" dirty="0">
-                <a:solidFill>
-                  <a:srgbClr val="37393C"/>
-                </a:solidFill>
-                <a:effectLst/>
-                <a:highlight>
-                  <a:srgbClr val="FFFFFF"/>
-                </a:highlight>
-              </a:rPr>
-              <a:t> </a:t>
-            </a:r>
-            <a:r>
-              <a:rPr lang="en-US" b="0" i="0" dirty="0" err="1">
-                <a:solidFill>
-                  <a:srgbClr val="37393C"/>
-                </a:solidFill>
-                <a:effectLst/>
-                <a:highlight>
-                  <a:srgbClr val="FFFFFF"/>
-                </a:highlight>
-              </a:rPr>
-              <a:t>em</a:t>
-            </a:r>
-            <a:r>
-              <a:rPr lang="en-US" b="0" i="0" dirty="0">
-                <a:solidFill>
-                  <a:srgbClr val="37393C"/>
-                </a:solidFill>
-                <a:effectLst/>
-                <a:highlight>
-                  <a:srgbClr val="FFFFFF"/>
-                </a:highlight>
-              </a:rPr>
-              <a:t>: 18 jun. 2024.</a:t>
-            </a:r>
-          </a:p>
-          <a:p>
-            <a:r>
-              <a:rPr lang="pt-BR" b="1" dirty="0" err="1">
-                <a:effectLst/>
-              </a:rPr>
-              <a:t>Critical</a:t>
-            </a:r>
-            <a:r>
-              <a:rPr lang="pt-BR" b="1" dirty="0">
-                <a:effectLst/>
-              </a:rPr>
-              <a:t> path </a:t>
-            </a:r>
-            <a:r>
-              <a:rPr lang="pt-BR" b="1" dirty="0" err="1">
-                <a:effectLst/>
-              </a:rPr>
-              <a:t>analysis</a:t>
-            </a:r>
-            <a:r>
-              <a:rPr lang="pt-BR" dirty="0">
-                <a:effectLst/>
-              </a:rPr>
-              <a:t>. Disponível em: &lt;https://www.studysmarter.co.uk/</a:t>
-            </a:r>
-            <a:r>
-              <a:rPr lang="pt-BR" dirty="0" err="1">
-                <a:effectLst/>
-              </a:rPr>
-              <a:t>explanations</a:t>
-            </a:r>
-            <a:r>
-              <a:rPr lang="pt-BR" dirty="0">
-                <a:effectLst/>
-              </a:rPr>
-              <a:t>/</a:t>
-            </a:r>
-            <a:r>
-              <a:rPr lang="pt-BR" dirty="0" err="1">
-                <a:effectLst/>
-              </a:rPr>
-              <a:t>math</a:t>
-            </a:r>
-            <a:r>
-              <a:rPr lang="pt-BR" dirty="0">
-                <a:effectLst/>
-              </a:rPr>
-              <a:t>/</a:t>
-            </a:r>
-            <a:r>
-              <a:rPr lang="pt-BR" dirty="0" err="1">
-                <a:effectLst/>
-              </a:rPr>
-              <a:t>decision-maths</a:t>
-            </a:r>
-            <a:r>
-              <a:rPr lang="pt-BR" dirty="0">
-                <a:effectLst/>
-              </a:rPr>
-              <a:t>/</a:t>
-            </a:r>
-            <a:r>
-              <a:rPr lang="pt-BR" dirty="0" err="1">
-                <a:effectLst/>
-              </a:rPr>
-              <a:t>critical</a:t>
-            </a:r>
-            <a:r>
-              <a:rPr lang="pt-BR" dirty="0">
-                <a:effectLst/>
-              </a:rPr>
-              <a:t>-path-</a:t>
-            </a:r>
-            <a:r>
-              <a:rPr lang="pt-BR" dirty="0" err="1">
-                <a:effectLst/>
-              </a:rPr>
-              <a:t>analysis</a:t>
-            </a:r>
-            <a:r>
-              <a:rPr lang="pt-BR" dirty="0">
-                <a:effectLst/>
-              </a:rPr>
-              <a:t>/&gt;. Acesso em: 18 jun. 2024.</a:t>
-            </a:r>
-          </a:p>
-          <a:p>
-            <a:r>
-              <a:rPr lang="pt-BR" dirty="0">
-                <a:effectLst/>
-              </a:rPr>
-              <a:t>EBY, K. </a:t>
-            </a:r>
-            <a:r>
-              <a:rPr lang="pt-BR" b="1" dirty="0">
-                <a:effectLst/>
-              </a:rPr>
-              <a:t>The </a:t>
-            </a:r>
-            <a:r>
-              <a:rPr lang="pt-BR" b="1" dirty="0" err="1">
-                <a:effectLst/>
-              </a:rPr>
-              <a:t>ultimate</a:t>
-            </a:r>
-            <a:r>
-              <a:rPr lang="pt-BR" b="1" dirty="0">
-                <a:effectLst/>
-              </a:rPr>
-              <a:t> </a:t>
-            </a:r>
-            <a:r>
-              <a:rPr lang="pt-BR" b="1" dirty="0" err="1">
-                <a:effectLst/>
-              </a:rPr>
-              <a:t>guide</a:t>
-            </a:r>
-            <a:r>
-              <a:rPr lang="pt-BR" b="1" dirty="0">
-                <a:effectLst/>
-              </a:rPr>
-              <a:t> </a:t>
-            </a:r>
-            <a:r>
-              <a:rPr lang="pt-BR" b="1" dirty="0" err="1">
-                <a:effectLst/>
-              </a:rPr>
-              <a:t>to</a:t>
-            </a:r>
-            <a:r>
-              <a:rPr lang="pt-BR" b="1" dirty="0">
-                <a:effectLst/>
-              </a:rPr>
-              <a:t> </a:t>
-            </a:r>
-            <a:r>
-              <a:rPr lang="pt-BR" b="1" dirty="0" err="1">
-                <a:effectLst/>
-              </a:rPr>
-              <a:t>the</a:t>
-            </a:r>
-            <a:r>
-              <a:rPr lang="pt-BR" b="1" dirty="0">
-                <a:effectLst/>
-              </a:rPr>
-              <a:t> </a:t>
-            </a:r>
-            <a:r>
-              <a:rPr lang="pt-BR" b="1" dirty="0" err="1">
-                <a:effectLst/>
-              </a:rPr>
-              <a:t>critical</a:t>
-            </a:r>
-            <a:r>
-              <a:rPr lang="pt-BR" b="1" dirty="0">
-                <a:effectLst/>
-              </a:rPr>
-              <a:t> path </a:t>
-            </a:r>
-            <a:r>
-              <a:rPr lang="pt-BR" b="1" dirty="0" err="1">
-                <a:effectLst/>
-              </a:rPr>
-              <a:t>method</a:t>
-            </a:r>
-            <a:r>
-              <a:rPr lang="pt-BR" dirty="0">
-                <a:effectLst/>
-              </a:rPr>
-              <a:t>. </a:t>
-            </a:r>
-            <a:r>
-              <a:rPr lang="pt-BR" b="1" dirty="0" err="1">
-                <a:effectLst/>
-              </a:rPr>
-              <a:t>Smartsheet</a:t>
-            </a:r>
-            <a:r>
-              <a:rPr lang="pt-BR" dirty="0">
-                <a:effectLst/>
-              </a:rPr>
-              <a:t>, 30 abr. 2015. Disponível em: &lt;https://www.smartsheet.com/</a:t>
-            </a:r>
-            <a:r>
-              <a:rPr lang="pt-BR" dirty="0" err="1">
-                <a:effectLst/>
-              </a:rPr>
-              <a:t>critical</a:t>
-            </a:r>
-            <a:r>
-              <a:rPr lang="pt-BR" dirty="0">
-                <a:effectLst/>
-              </a:rPr>
-              <a:t>-path-</a:t>
-            </a:r>
-            <a:r>
-              <a:rPr lang="pt-BR" dirty="0" err="1">
-                <a:effectLst/>
-              </a:rPr>
-              <a:t>method</a:t>
-            </a:r>
-            <a:r>
-              <a:rPr lang="pt-BR" dirty="0">
-                <a:effectLst/>
-              </a:rPr>
-              <a:t>&gt;. Acesso em: 18 jun. 2024</a:t>
-            </a:r>
-          </a:p>
-          <a:p>
-            <a:r>
-              <a:rPr lang="pt-BR" dirty="0">
-                <a:effectLst/>
-              </a:rPr>
-              <a:t>WIKIPEDIA CONTRIBUTORS. </a:t>
-            </a:r>
-            <a:r>
-              <a:rPr lang="pt-BR" b="1" dirty="0" err="1">
-                <a:effectLst/>
-              </a:rPr>
-              <a:t>Critical</a:t>
-            </a:r>
-            <a:r>
-              <a:rPr lang="pt-BR" b="1" dirty="0">
-                <a:effectLst/>
-              </a:rPr>
-              <a:t> path </a:t>
-            </a:r>
-            <a:r>
-              <a:rPr lang="pt-BR" b="1" dirty="0" err="1">
-                <a:effectLst/>
-              </a:rPr>
-              <a:t>method</a:t>
-            </a:r>
-            <a:r>
-              <a:rPr lang="pt-BR" dirty="0">
-                <a:effectLst/>
-              </a:rPr>
-              <a:t>. Disponível em: &lt;https://en.wikipedia.org/w/</a:t>
-            </a:r>
-            <a:r>
-              <a:rPr lang="pt-BR" dirty="0" err="1">
-                <a:effectLst/>
-              </a:rPr>
-              <a:t>index.php?title</a:t>
-            </a:r>
-            <a:r>
-              <a:rPr lang="pt-BR" dirty="0">
-                <a:effectLst/>
-              </a:rPr>
-              <a:t>=</a:t>
-            </a:r>
-            <a:r>
-              <a:rPr lang="pt-BR" dirty="0" err="1">
-                <a:effectLst/>
-              </a:rPr>
-              <a:t>Critical_path_method&amp;oldid</a:t>
-            </a:r>
-            <a:r>
-              <a:rPr lang="pt-BR" dirty="0">
-                <a:effectLst/>
-              </a:rPr>
-              <a:t>=1222967231&gt;.</a:t>
-            </a:r>
-          </a:p>
-          <a:p>
-            <a:r>
-              <a:rPr lang="pt-BR" dirty="0">
-                <a:effectLst/>
-              </a:rPr>
-              <a:t>Disponível em: &lt;https://www.pmi.org/learning/</a:t>
-            </a:r>
-            <a:r>
-              <a:rPr lang="pt-BR" dirty="0" err="1">
-                <a:effectLst/>
-              </a:rPr>
-              <a:t>library</a:t>
-            </a:r>
-            <a:r>
-              <a:rPr lang="pt-BR" dirty="0">
-                <a:effectLst/>
-              </a:rPr>
-              <a:t>/schedule-risk-analysis-simplified-10573&gt;. Acesso em: 18 jun. 2024.</a:t>
-            </a:r>
-          </a:p>
-        </p:txBody>
-      </p:sp>
-      <p:sp>
-        <p:nvSpPr>
-          <p:cNvPr id="4" name="Espaço Reservado para Data 3">
-            <a:extLst>
-              <a:ext uri="{FF2B5EF4-FFF2-40B4-BE49-F238E27FC236}">
-                <a16:creationId xmlns:a16="http://schemas.microsoft.com/office/drawing/2014/main" id="{E575A558-438B-6388-C74A-CB3D2C97D3F8}"/>
-              </a:ext>
-            </a:extLst>
-          </p:cNvPr>
-          <p:cNvSpPr>
-            <a:spLocks noGrp="1"/>
-          </p:cNvSpPr>
-          <p:nvPr>
-            <p:ph type="dt" sz="half" idx="10"/>
-          </p:nvPr>
-        </p:nvSpPr>
-        <p:spPr/>
-        <p:txBody>
           <a:bodyPr/>
           <a:lstStyle/>
           <a:p>
-            <a:fld id="{5C0E8BC3-A60E-4E31-8AE4-2BE08893AD21}" type="datetime1">
+            <a:fld id="{849DBC12-8832-4109-B94F-AE3BC83E673C}" type="datetime1">
               <a:rPr lang="en-US" smtClean="0"/>
               <a:t>6/18/2024</a:t>
             </a:fld>
@@ -9592,7 +11609,7 @@
           <p:cNvPr id="5" name="Espaço Reservado para Rodapé 4">
             <a:extLst>
               <a:ext uri="{FF2B5EF4-FFF2-40B4-BE49-F238E27FC236}">
-                <a16:creationId xmlns:a16="http://schemas.microsoft.com/office/drawing/2014/main" id="{5792529F-47F6-73F8-4E0C-FA5B71473D22}"/>
+                <a16:creationId xmlns:a16="http://schemas.microsoft.com/office/drawing/2014/main" id="{7C18FCF8-F5B6-C2AF-47B5-1C3C476ADBFA}"/>
               </a:ext>
             </a:extLst>
           </p:cNvPr>
@@ -9609,7 +11626,7 @@
           <a:lstStyle/>
           <a:p>
             <a:r>
-              <a:rPr lang="en-US" dirty="0"/>
+              <a:rPr lang="en-US"/>
               <a:t>
               </a:t>
             </a:r>
@@ -9621,7 +11638,7 @@
           <p:cNvPr id="6" name="Espaço Reservado para Número de Slide 5">
             <a:extLst>
               <a:ext uri="{FF2B5EF4-FFF2-40B4-BE49-F238E27FC236}">
-                <a16:creationId xmlns:a16="http://schemas.microsoft.com/office/drawing/2014/main" id="{6590052F-4EE3-8698-0A10-CB8C4E35A1E4}"/>
+                <a16:creationId xmlns:a16="http://schemas.microsoft.com/office/drawing/2014/main" id="{783ECE08-A5C0-D382-8249-5050EB649FBE}"/>
               </a:ext>
             </a:extLst>
           </p:cNvPr>
@@ -9648,7 +11665,7 @@
     </p:spTree>
     <p:extLst>
       <p:ext uri="{BB962C8B-B14F-4D97-AF65-F5344CB8AC3E}">
-        <p14:creationId xmlns:p14="http://schemas.microsoft.com/office/powerpoint/2010/main" val="2097304172"/>
+        <p14:creationId xmlns:p14="http://schemas.microsoft.com/office/powerpoint/2010/main" val="813822317"/>
       </p:ext>
     </p:extLst>
   </p:cSld>
@@ -9680,7 +11697,7 @@
           <p:cNvPr id="2" name="Título 1">
             <a:extLst>
               <a:ext uri="{FF2B5EF4-FFF2-40B4-BE49-F238E27FC236}">
-                <a16:creationId xmlns:a16="http://schemas.microsoft.com/office/drawing/2014/main" id="{B1F35A36-4B8A-CC21-A7B3-D24FC5357485}"/>
+                <a16:creationId xmlns:a16="http://schemas.microsoft.com/office/drawing/2014/main" id="{A7EC0090-83D8-DB09-3E8D-B27611167555}"/>
               </a:ext>
             </a:extLst>
           </p:cNvPr>
@@ -9691,47 +11708,69 @@
             <p:ph type="title"/>
           </p:nvPr>
         </p:nvSpPr>
+        <p:spPr/>
+        <p:txBody>
+          <a:bodyPr/>
+          <a:lstStyle/>
+          <a:p>
+            <a:r>
+              <a:rPr lang="pt-BR" dirty="0"/>
+              <a:t>Grafo</a:t>
+            </a:r>
+          </a:p>
+        </p:txBody>
+      </p:sp>
+      <p:pic>
+        <p:nvPicPr>
+          <p:cNvPr id="8" name="Espaço Reservado para Conteúdo 7">
+            <a:extLst>
+              <a:ext uri="{FF2B5EF4-FFF2-40B4-BE49-F238E27FC236}">
+                <a16:creationId xmlns:a16="http://schemas.microsoft.com/office/drawing/2014/main" id="{511A7518-9CCE-551A-1B5E-7B91241C4971}"/>
+              </a:ext>
+            </a:extLst>
+          </p:cNvPr>
+          <p:cNvPicPr>
+            <a:picLocks noGrp="1" noChangeAspect="1"/>
+          </p:cNvPicPr>
+          <p:nvPr>
+            <p:ph idx="1"/>
+          </p:nvPr>
+        </p:nvPicPr>
+        <p:blipFill>
+          <a:blip r:embed="rId2"/>
+          <a:stretch>
+            <a:fillRect/>
+          </a:stretch>
+        </p:blipFill>
         <p:spPr>
           <a:xfrm>
-            <a:off x="1371828" y="2217082"/>
-            <a:ext cx="9448343" cy="1820173"/>
+            <a:off x="1445120" y="2292350"/>
+            <a:ext cx="9201747" cy="3636963"/>
           </a:xfrm>
         </p:spPr>
+      </p:pic>
+      <p:sp>
+        <p:nvSpPr>
+          <p:cNvPr id="4" name="Espaço Reservado para Data 3">
+            <a:extLst>
+              <a:ext uri="{FF2B5EF4-FFF2-40B4-BE49-F238E27FC236}">
+                <a16:creationId xmlns:a16="http://schemas.microsoft.com/office/drawing/2014/main" id="{6620B30F-A803-EC3F-D1E9-A71EE5A6A202}"/>
+              </a:ext>
+            </a:extLst>
+          </p:cNvPr>
+          <p:cNvSpPr>
+            <a:spLocks noGrp="1"/>
+          </p:cNvSpPr>
+          <p:nvPr>
+            <p:ph type="dt" sz="half" idx="10"/>
+          </p:nvPr>
+        </p:nvSpPr>
+        <p:spPr/>
         <p:txBody>
           <a:bodyPr/>
           <a:lstStyle/>
           <a:p>
-            <a:pPr algn="ctr"/>
-            <a:r>
-              <a:rPr lang="en-US" sz="5400" err="1"/>
-              <a:t>Obrigado</a:t>
-            </a:r>
-            <a:endParaRPr lang="pt-BR" sz="5400"/>
-          </a:p>
-        </p:txBody>
-      </p:sp>
-      <p:sp>
-        <p:nvSpPr>
-          <p:cNvPr id="4" name="Espaço Reservado para Data 3">
-            <a:extLst>
-              <a:ext uri="{FF2B5EF4-FFF2-40B4-BE49-F238E27FC236}">
-                <a16:creationId xmlns:a16="http://schemas.microsoft.com/office/drawing/2014/main" id="{50137EE9-4887-8E0A-6349-CC3BFA083A91}"/>
-              </a:ext>
-            </a:extLst>
-          </p:cNvPr>
-          <p:cNvSpPr>
-            <a:spLocks noGrp="1"/>
-          </p:cNvSpPr>
-          <p:nvPr>
-            <p:ph type="dt" sz="half" idx="10"/>
-          </p:nvPr>
-        </p:nvSpPr>
-        <p:spPr/>
-        <p:txBody>
-          <a:bodyPr/>
-          <a:lstStyle/>
-          <a:p>
-            <a:fld id="{8ADC9E49-246E-484A-926C-3041536DB8F7}" type="datetime1">
+            <a:fld id="{D5A8BB94-DC79-4995-A92F-B6C5EF989898}" type="datetime1">
               <a:rPr lang="en-US" smtClean="0"/>
               <a:t>6/18/2024</a:t>
             </a:fld>
@@ -9744,7 +11783,7 @@
           <p:cNvPr id="5" name="Espaço Reservado para Rodapé 4">
             <a:extLst>
               <a:ext uri="{FF2B5EF4-FFF2-40B4-BE49-F238E27FC236}">
-                <a16:creationId xmlns:a16="http://schemas.microsoft.com/office/drawing/2014/main" id="{F359168D-AE6A-4BA1-7FED-DC37B5B538AC}"/>
+                <a16:creationId xmlns:a16="http://schemas.microsoft.com/office/drawing/2014/main" id="{661FEDE9-AB8F-1AF8-14F3-D4DD36DE0904}"/>
               </a:ext>
             </a:extLst>
           </p:cNvPr>
@@ -9773,7 +11812,7 @@
           <p:cNvPr id="6" name="Espaço Reservado para Número de Slide 5">
             <a:extLst>
               <a:ext uri="{FF2B5EF4-FFF2-40B4-BE49-F238E27FC236}">
-                <a16:creationId xmlns:a16="http://schemas.microsoft.com/office/drawing/2014/main" id="{4880F13E-F76E-22C7-A8C6-39DB72471046}"/>
+                <a16:creationId xmlns:a16="http://schemas.microsoft.com/office/drawing/2014/main" id="{A2623F89-D306-1BE2-0611-C57A61957D68}"/>
               </a:ext>
             </a:extLst>
           </p:cNvPr>
@@ -9789,7 +11828,7 @@
           <a:bodyPr/>
           <a:lstStyle/>
           <a:p>
-            <a:fld id="{196A61CA-0502-4EE4-9724-96EA822543E5}" type="slidenum">
+            <a:fld id="{E30AF5A0-43BB-4336-8627-9123B9144D80}" type="slidenum">
               <a:rPr lang="en-US" smtClean="0"/>
               <a:t>9</a:t>
             </a:fld>
@@ -9800,7 +11839,7 @@
     </p:spTree>
     <p:extLst>
       <p:ext uri="{BB962C8B-B14F-4D97-AF65-F5344CB8AC3E}">
-        <p14:creationId xmlns:p14="http://schemas.microsoft.com/office/powerpoint/2010/main" val="2210678312"/>
+        <p14:creationId xmlns:p14="http://schemas.microsoft.com/office/powerpoint/2010/main" val="4261432874"/>
       </p:ext>
     </p:extLst>
   </p:cSld>

</xml_diff>